<commit_message>
debugged and added export functions
- rounded the remain of the divisioin in the time loop
- export functions added to timeloop
</commit_message>
<xml_diff>
--- a/AAA_CV_setup_app_design.pptx
+++ b/AAA_CV_setup_app_design.pptx
@@ -206,7 +206,7 @@
           <a:p>
             <a:fld id="{11DA9B39-1A93-442F-9E93-3C2E66155B8D}" type="datetimeFigureOut">
               <a:rPr lang="en-US" smtClean="0"/>
-              <a:t>4/11/2019</a:t>
+              <a:t>4/12/2019</a:t>
             </a:fld>
             <a:endParaRPr lang="en-US"/>
           </a:p>
@@ -1392,7 +1392,7 @@
           <a:p>
             <a:fld id="{9EADFFF0-BD26-4274-9750-7440B44BAE1F}" type="datetimeFigureOut">
               <a:rPr lang="en-US" smtClean="0"/>
-              <a:t>4/11/2019</a:t>
+              <a:t>4/12/2019</a:t>
             </a:fld>
             <a:endParaRPr lang="en-US"/>
           </a:p>
@@ -1802,7 +1802,7 @@
           <a:p>
             <a:fld id="{9EADFFF0-BD26-4274-9750-7440B44BAE1F}" type="datetimeFigureOut">
               <a:rPr lang="en-US" smtClean="0"/>
-              <a:t>4/11/2019</a:t>
+              <a:t>4/12/2019</a:t>
             </a:fld>
             <a:endParaRPr lang="en-US"/>
           </a:p>
@@ -2042,7 +2042,7 @@
           <a:p>
             <a:fld id="{9EADFFF0-BD26-4274-9750-7440B44BAE1F}" type="datetimeFigureOut">
               <a:rPr lang="en-US" smtClean="0"/>
-              <a:t>4/11/2019</a:t>
+              <a:t>4/12/2019</a:t>
             </a:fld>
             <a:endParaRPr lang="en-US"/>
           </a:p>
@@ -12064,12 +12064,26 @@
               <a:buNone/>
             </a:pPr>
             <a:r>
+              <a:rPr lang="en-US" sz="2000"/>
+              <a:t>MD(mu).</a:t>
+            </a:r>
+            <a:r>
               <a:rPr lang="en-US" sz="2000" dirty="0"/>
-              <a:t>MD(1).</a:t>
-            </a:r>
-            <a:r>
-              <a:rPr lang="en-US" sz="2000" dirty="0" err="1"/>
-              <a:t>MDdata.finish_counter</a:t>
+              <a:t>MDdata.cycle_counter </a:t>
+            </a:r>
+            <a:r>
+              <a:rPr lang="en-US" sz="2000" dirty="0">
+                <a:solidFill>
+                  <a:schemeClr val="accent1">
+                    <a:lumMod val="75000"/>
+                  </a:schemeClr>
+                </a:solidFill>
+              </a:rPr>
+              <a:t>Number of cycles performed (= number of bias iterations</a:t>
+            </a:r>
+            <a:r>
+              <a:rPr lang="en-US" sz="2000" dirty="0"/>
+              <a:t>)</a:t>
             </a:r>
             <a:endParaRPr lang="en-US" sz="2000" dirty="0">
               <a:solidFill>

</xml_diff>

<commit_message>
Added logs to measurement events
- log CV start time
- log Bias start time
- log Bias completed time
- added these events to the temperature vs time plot
</commit_message>
<xml_diff>
--- a/AAA_CV_setup_app_design.pptx
+++ b/AAA_CV_setup_app_design.pptx
@@ -2583,7 +2583,7 @@
         </p:spPr>
         <p:txBody>
           <a:bodyPr>
-            <a:normAutofit/>
+            <a:normAutofit lnSpcReduction="10000"/>
           </a:bodyPr>
           <a:lstStyle/>
           <a:p>
@@ -2846,7 +2846,7 @@
               <a:t>MDdata.startbiastime</a:t>
             </a:r>
             <a:r>
-              <a:rPr lang="en-US" sz="2000">
+              <a:rPr lang="en-US" sz="2000" dirty="0">
                 <a:solidFill>
                   <a:schemeClr val="accent1">
                     <a:lumMod val="75000"/>
@@ -2855,13 +2855,33 @@
               </a:rPr>
               <a:t>.</a:t>
             </a:r>
-            <a:endParaRPr lang="en-US" sz="2000" dirty="0">
-              <a:solidFill>
-                <a:schemeClr val="accent1">
-                  <a:lumMod val="75000"/>
-                </a:schemeClr>
-              </a:solidFill>
-            </a:endParaRPr>
+          </a:p>
+          <a:p>
+            <a:pPr marL="0" indent="0">
+              <a:buNone/>
+            </a:pPr>
+            <a:r>
+              <a:rPr lang="en-US" sz="2000" dirty="0"/>
+              <a:t>MD(mu).</a:t>
+            </a:r>
+            <a:r>
+              <a:rPr lang="en-US" sz="2000" dirty="0" err="1"/>
+              <a:t>ExpData.log.endBiasTime</a:t>
+            </a:r>
+            <a:r>
+              <a:rPr lang="en-US" sz="2000" dirty="0"/>
+              <a:t> </a:t>
+            </a:r>
+            <a:r>
+              <a:rPr lang="en-US" sz="2000" dirty="0">
+                <a:solidFill>
+                  <a:schemeClr val="accent1">
+                    <a:lumMod val="75000"/>
+                  </a:schemeClr>
+                </a:solidFill>
+              </a:rPr>
+              <a:t>vector containing the time at which stress bias was completed on each unit.</a:t>
+            </a:r>
           </a:p>
           <a:p>
             <a:pPr marL="0" indent="0">

</xml_diff>

<commit_message>
starting updates on to bias only part of the pins
</commit_message>
<xml_diff>
--- a/AAA_CV_setup_app_design.pptx
+++ b/AAA_CV_setup_app_design.pptx
@@ -207,7 +207,7 @@
           <a:p>
             <a:fld id="{11DA9B39-1A93-442F-9E93-3C2E66155B8D}" type="datetimeFigureOut">
               <a:rPr lang="en-US" smtClean="0"/>
-              <a:t>4/19/2019</a:t>
+              <a:t>4/22/2019</a:t>
             </a:fld>
             <a:endParaRPr lang="en-US"/>
           </a:p>
@@ -1477,7 +1477,7 @@
           <a:p>
             <a:fld id="{9EADFFF0-BD26-4274-9750-7440B44BAE1F}" type="datetimeFigureOut">
               <a:rPr lang="en-US" smtClean="0"/>
-              <a:t>4/19/2019</a:t>
+              <a:t>4/22/2019</a:t>
             </a:fld>
             <a:endParaRPr lang="en-US"/>
           </a:p>
@@ -1887,7 +1887,7 @@
           <a:p>
             <a:fld id="{9EADFFF0-BD26-4274-9750-7440B44BAE1F}" type="datetimeFigureOut">
               <a:rPr lang="en-US" smtClean="0"/>
-              <a:t>4/19/2019</a:t>
+              <a:t>4/22/2019</a:t>
             </a:fld>
             <a:endParaRPr lang="en-US"/>
           </a:p>
@@ -2127,7 +2127,7 @@
           <a:p>
             <a:fld id="{9EADFFF0-BD26-4274-9750-7440B44BAE1F}" type="datetimeFigureOut">
               <a:rPr lang="en-US" smtClean="0"/>
-              <a:t>4/19/2019</a:t>
+              <a:t>4/22/2019</a:t>
             </a:fld>
             <a:endParaRPr lang="en-US"/>
           </a:p>
@@ -3139,7 +3139,7 @@
         </p:spPr>
         <p:txBody>
           <a:bodyPr>
-            <a:normAutofit lnSpcReduction="10000"/>
+            <a:normAutofit fontScale="92500"/>
           </a:bodyPr>
           <a:lstStyle/>
           <a:p>
@@ -3257,11 +3257,11 @@
             </a:r>
             <a:r>
               <a:rPr lang="en-US" sz="2000" dirty="0" err="1"/>
-              <a:t>ExpData.log.Vbias</a:t>
+              <a:t>ExpData.log.BiasStatus</a:t>
             </a:r>
             <a:r>
               <a:rPr lang="en-US" sz="2000" dirty="0"/>
-              <a:t>=[0 0 0 7 7 7 7 7 7 7] </a:t>
+              <a:t>=[1 1 1 1 1 1] </a:t>
             </a:r>
             <a:r>
               <a:rPr lang="en-US" sz="2000" dirty="0">
@@ -3269,7 +3269,39 @@
                   <a:schemeClr val="accent5"/>
                 </a:solidFill>
               </a:rPr>
-              <a:t>value of bias voltage log (saved at the same time as t)</a:t>
+              <a:t>Status to which bias is set at each time </a:t>
+            </a:r>
+            <a:r>
+              <a:rPr lang="en-US" sz="2000" dirty="0" err="1">
+                <a:solidFill>
+                  <a:schemeClr val="accent5"/>
+                </a:solidFill>
+              </a:rPr>
+              <a:t>startbiastime</a:t>
+            </a:r>
+            <a:r>
+              <a:rPr lang="en-US" sz="2000" dirty="0">
+                <a:solidFill>
+                  <a:schemeClr val="accent5"/>
+                </a:solidFill>
+              </a:rPr>
+              <a:t> (1 if the pin is turned on for the duration of the steady-state cycle, </a:t>
+            </a:r>
+            <a:r>
+              <a:rPr lang="en-US" sz="2000" dirty="0" err="1">
+                <a:solidFill>
+                  <a:schemeClr val="accent5"/>
+                </a:solidFill>
+              </a:rPr>
+              <a:t>ie</a:t>
+            </a:r>
+            <a:r>
+              <a:rPr lang="en-US" sz="2000" dirty="0">
+                <a:solidFill>
+                  <a:schemeClr val="accent5"/>
+                </a:solidFill>
+              </a:rPr>
+              <a:t> bias is on)</a:t>
             </a:r>
           </a:p>
           <a:p>
@@ -18638,8 +18670,8 @@
         </p:nvSpPr>
         <p:spPr>
           <a:xfrm>
-            <a:off x="125428" y="798615"/>
-            <a:ext cx="12284285" cy="5498276"/>
+            <a:off x="0" y="673101"/>
+            <a:ext cx="12284285" cy="5647905"/>
           </a:xfrm>
         </p:spPr>
         <p:txBody>
@@ -18660,25 +18692,62 @@
             <a:pPr marL="0" indent="0">
               <a:buNone/>
             </a:pPr>
-            <a:endParaRPr lang="en-US" sz="2000" u="sng" dirty="0"/>
+            <a:r>
+              <a:rPr lang="en-US" sz="2000" b="1" dirty="0"/>
+              <a:t>MD structure (Measurement Data)</a:t>
+            </a:r>
+          </a:p>
+          <a:p>
+            <a:r>
+              <a:rPr lang="en-US" sz="2000" b="1" dirty="0" err="1"/>
+              <a:t>PinState</a:t>
+            </a:r>
+            <a:r>
+              <a:rPr lang="en-US" sz="2000" b="1" dirty="0"/>
+              <a:t> structure contains the on/off sate of all pins (off in case one pin is not used):</a:t>
+            </a:r>
           </a:p>
           <a:p>
             <a:pPr marL="0" indent="0">
               <a:buNone/>
             </a:pPr>
             <a:r>
+              <a:rPr lang="en-US" sz="2000" dirty="0"/>
+              <a:t>MD(mu).</a:t>
+            </a:r>
+            <a:r>
+              <a:rPr lang="en-US" sz="2000" dirty="0" err="1"/>
+              <a:t>PinState</a:t>
+            </a:r>
+            <a:r>
+              <a:rPr lang="en-US" sz="2000" dirty="0"/>
+              <a:t>=[1 1 1 1 1 1 1 1], MD(2).</a:t>
+            </a:r>
+            <a:r>
+              <a:rPr lang="en-US" sz="2000" dirty="0" err="1"/>
+              <a:t>PinState</a:t>
+            </a:r>
+            <a:r>
+              <a:rPr lang="en-US" sz="2000" dirty="0"/>
+              <a:t>, MD(3).</a:t>
+            </a:r>
+            <a:r>
+              <a:rPr lang="en-US" sz="2000" dirty="0" err="1"/>
+              <a:t>PinState</a:t>
+            </a:r>
+            <a:r>
+              <a:rPr lang="en-US" sz="2000" dirty="0"/>
+              <a:t>.</a:t>
+            </a:r>
+          </a:p>
+          <a:p>
+            <a:r>
+              <a:rPr lang="en-US" sz="2000" b="1" dirty="0" err="1"/>
+              <a:t>BiasPinState</a:t>
+            </a:r>
+            <a:r>
               <a:rPr lang="en-US" sz="2000" b="1" dirty="0"/>
-              <a:t>MD structure (Measurement Data)</a:t>
-            </a:r>
-          </a:p>
-          <a:p>
-            <a:r>
-              <a:rPr lang="en-US" sz="2000" b="1" dirty="0" err="1"/>
-              <a:t>PinState</a:t>
-            </a:r>
-            <a:r>
-              <a:rPr lang="en-US" sz="2000" b="1" dirty="0"/>
-              <a:t> structure contains the on/off sate of all pins (off in case one pin is not used):</a:t>
+              <a:t> contains on/off state of pins during bias cycles (in case control samples 1-4 are Na-contaminated)</a:t>
             </a:r>
           </a:p>
           <a:p>
@@ -18691,15 +18760,15 @@
             </a:r>
             <a:r>
               <a:rPr lang="en-US" sz="2000" dirty="0" err="1"/>
-              <a:t>PinState</a:t>
+              <a:t>BiasPinState</a:t>
             </a:r>
             <a:r>
               <a:rPr lang="en-US" sz="2000" dirty="0"/>
-              <a:t>=[1 1 1 1 1 1 1 1], MD(2).</a:t>
+              <a:t>=[0 0 0 0 1 1 1 1], MD(2).</a:t>
             </a:r>
             <a:r>
               <a:rPr lang="en-US" sz="2000" dirty="0" err="1"/>
-              <a:t>PinState</a:t>
+              <a:t>BiasPinState</a:t>
             </a:r>
             <a:r>
               <a:rPr lang="en-US" sz="2000" dirty="0"/>
@@ -18707,12 +18776,21 @@
             </a:r>
             <a:r>
               <a:rPr lang="en-US" sz="2000" dirty="0" err="1"/>
-              <a:t>PinState</a:t>
+              <a:t>BiasPinState</a:t>
             </a:r>
             <a:r>
               <a:rPr lang="en-US" sz="2000" dirty="0"/>
-              <a:t>.</a:t>
-            </a:r>
+              <a:t> </a:t>
+            </a:r>
+            <a:r>
+              <a:rPr lang="en-US" sz="2000" dirty="0">
+                <a:solidFill>
+                  <a:schemeClr val="accent5"/>
+                </a:solidFill>
+              </a:rPr>
+              <a:t>if 0, pin is kept off during steady-state bias</a:t>
+            </a:r>
+            <a:endParaRPr lang="en-US" sz="2000" dirty="0"/>
           </a:p>
           <a:p>
             <a:r>
@@ -19787,6 +19865,62 @@
               </a:rPr>
               <a:t>vector containing the standard deviation of flatband at each time point</a:t>
             </a:r>
+          </a:p>
+          <a:p>
+            <a:pPr marL="0" indent="0">
+              <a:buNone/>
+            </a:pPr>
+            <a:r>
+              <a:rPr lang="en-US" sz="2000" dirty="0"/>
+              <a:t>MD(mu).</a:t>
+            </a:r>
+            <a:r>
+              <a:rPr lang="en-US" sz="2000" dirty="0" err="1"/>
+              <a:t>ExpData.Pin</a:t>
+            </a:r>
+            <a:r>
+              <a:rPr lang="en-US" sz="2000" dirty="0"/>
+              <a:t>(</a:t>
+            </a:r>
+            <a:r>
+              <a:rPr lang="en-US" sz="2000" dirty="0" err="1"/>
+              <a:t>i</a:t>
+            </a:r>
+            <a:r>
+              <a:rPr lang="en-US" sz="2000" dirty="0"/>
+              <a:t>).IV </a:t>
+            </a:r>
+            <a:r>
+              <a:rPr lang="en-US" sz="2000" dirty="0">
+                <a:solidFill>
+                  <a:schemeClr val="accent5"/>
+                </a:solidFill>
+              </a:rPr>
+              <a:t>cell containing the IV curves </a:t>
+            </a:r>
+            <a:r>
+              <a:rPr lang="en-US" sz="2000">
+                <a:solidFill>
+                  <a:schemeClr val="accent5"/>
+                </a:solidFill>
+              </a:rPr>
+              <a:t>for each pin</a:t>
+            </a:r>
+            <a:endParaRPr lang="en-US" sz="2000" dirty="0">
+              <a:solidFill>
+                <a:schemeClr val="accent5"/>
+              </a:solidFill>
+            </a:endParaRPr>
+          </a:p>
+          <a:p>
+            <a:pPr marL="0" indent="0">
+              <a:buNone/>
+            </a:pPr>
+            <a:endParaRPr lang="en-US" sz="2000" dirty="0">
+              <a:solidFill>
+                <a:schemeClr val="accent5"/>
+              </a:solidFill>
+            </a:endParaRPr>
           </a:p>
           <a:p>
             <a:pPr marL="0" indent="0">

</xml_diff>

<commit_message>
Removed plot handles from MD structure
Created a new structure called MD_plot where figure handles are saved.
Updated functions:
- RunIterCV (plotting CV curves)
- VFBfitNDeriv (plotting CV derivative curves)
- Flatbandfitting (plotting flatband as a function of time)

The function logvalues_ext plots current and temperature but does not access MD_plot as it uses the handles directly from the app.
</commit_message>
<xml_diff>
--- a/AAA_CV_setup_app_design.pptx
+++ b/AAA_CV_setup_app_design.pptx
@@ -15,10 +15,10 @@
     <p:sldId id="270" r:id="rId6"/>
     <p:sldId id="262" r:id="rId7"/>
     <p:sldId id="265" r:id="rId8"/>
-    <p:sldId id="267" r:id="rId9"/>
-    <p:sldId id="263" r:id="rId10"/>
-    <p:sldId id="269" r:id="rId11"/>
-    <p:sldId id="271" r:id="rId12"/>
+    <p:sldId id="263" r:id="rId9"/>
+    <p:sldId id="269" r:id="rId10"/>
+    <p:sldId id="271" r:id="rId11"/>
+    <p:sldId id="267" r:id="rId12"/>
   </p:sldIdLst>
   <p:sldSz cx="12192000" cy="6858000"/>
   <p:notesSz cx="6858000" cy="9144000"/>
@@ -207,7 +207,7 @@
           <a:p>
             <a:fld id="{11DA9B39-1A93-442F-9E93-3C2E66155B8D}" type="datetimeFigureOut">
               <a:rPr lang="en-US" smtClean="0"/>
-              <a:t>4/22/2019</a:t>
+              <a:t>5/7/2019</a:t>
             </a:fld>
             <a:endParaRPr lang="en-US"/>
           </a:p>
@@ -623,7 +623,7 @@
           <a:p>
             <a:fld id="{9BBC5525-AEE1-4EAC-9AB9-28E9B1DDDA69}" type="slidenum">
               <a:rPr lang="en-US" smtClean="0"/>
-              <a:t>11</a:t>
+              <a:t>10</a:t>
             </a:fld>
             <a:endParaRPr lang="en-US"/>
           </a:p>
@@ -1237,7 +1237,7 @@
           <a:p>
             <a:fld id="{9BBC5525-AEE1-4EAC-9AB9-28E9B1DDDA69}" type="slidenum">
               <a:rPr lang="en-US" smtClean="0"/>
-              <a:t>9</a:t>
+              <a:t>8</a:t>
             </a:fld>
             <a:endParaRPr lang="en-US"/>
           </a:p>
@@ -1321,7 +1321,7 @@
           <a:p>
             <a:fld id="{9BBC5525-AEE1-4EAC-9AB9-28E9B1DDDA69}" type="slidenum">
               <a:rPr lang="en-US" smtClean="0"/>
-              <a:t>10</a:t>
+              <a:t>9</a:t>
             </a:fld>
             <a:endParaRPr lang="en-US"/>
           </a:p>
@@ -1477,7 +1477,7 @@
           <a:p>
             <a:fld id="{9EADFFF0-BD26-4274-9750-7440B44BAE1F}" type="datetimeFigureOut">
               <a:rPr lang="en-US" smtClean="0"/>
-              <a:t>4/22/2019</a:t>
+              <a:t>5/7/2019</a:t>
             </a:fld>
             <a:endParaRPr lang="en-US"/>
           </a:p>
@@ -1887,7 +1887,7 @@
           <a:p>
             <a:fld id="{9EADFFF0-BD26-4274-9750-7440B44BAE1F}" type="datetimeFigureOut">
               <a:rPr lang="en-US" smtClean="0"/>
-              <a:t>4/22/2019</a:t>
+              <a:t>5/7/2019</a:t>
             </a:fld>
             <a:endParaRPr lang="en-US"/>
           </a:p>
@@ -2127,7 +2127,7 @@
           <a:p>
             <a:fld id="{9EADFFF0-BD26-4274-9750-7440B44BAE1F}" type="datetimeFigureOut">
               <a:rPr lang="en-US" smtClean="0"/>
-              <a:t>4/22/2019</a:t>
+              <a:t>5/7/2019</a:t>
             </a:fld>
             <a:endParaRPr lang="en-US"/>
           </a:p>
@@ -2668,7 +2668,7 @@
         </p:spPr>
         <p:txBody>
           <a:bodyPr>
-            <a:normAutofit/>
+            <a:normAutofit fontScale="92500"/>
           </a:bodyPr>
           <a:lstStyle/>
           <a:p>
@@ -2709,21 +2709,7 @@
             </a:r>
             <a:r>
               <a:rPr lang="en-US" sz="2000" dirty="0" err="1"/>
-              <a:t>ExpData.Setup.PreBiasTime</a:t>
-            </a:r>
-            <a:endParaRPr lang="en-US" sz="2000" dirty="0"/>
-          </a:p>
-          <a:p>
-            <a:pPr marL="0" indent="0">
-              <a:buNone/>
-            </a:pPr>
-            <a:r>
-              <a:rPr lang="en-US" sz="2000" dirty="0"/>
-              <a:t>MD(mu).</a:t>
-            </a:r>
-            <a:r>
-              <a:rPr lang="en-US" sz="2000" dirty="0" err="1"/>
-              <a:t>ExpData.Setup.t_offset_unit</a:t>
+              <a:t>ExpData.Setup.IterM</a:t>
             </a:r>
             <a:r>
               <a:rPr lang="en-US" sz="2000" dirty="0"/>
@@ -2735,7 +2721,84 @@
                   <a:schemeClr val="accent5"/>
                 </a:solidFill>
               </a:rPr>
-              <a:t>unit of the time offset (to define in </a:t>
+              <a:t>Number of repeated measurements per iteration</a:t>
+            </a:r>
+            <a:endParaRPr lang="en-US" sz="2000" dirty="0"/>
+          </a:p>
+          <a:p>
+            <a:pPr marL="0" indent="0">
+              <a:buNone/>
+            </a:pPr>
+            <a:r>
+              <a:rPr lang="en-US" sz="2000" dirty="0"/>
+              <a:t>MD(mu).</a:t>
+            </a:r>
+            <a:r>
+              <a:rPr lang="en-US" sz="2000" dirty="0" err="1"/>
+              <a:t>ExpData.log.T</a:t>
+            </a:r>
+            <a:r>
+              <a:rPr lang="en-US" sz="2000" dirty="0"/>
+              <a:t> </a:t>
+            </a:r>
+            <a:r>
+              <a:rPr lang="en-US" sz="2000" dirty="0">
+                <a:solidFill>
+                  <a:schemeClr val="accent5"/>
+                </a:solidFill>
+              </a:rPr>
+              <a:t>Array of temperature log (different for each MU) TO INITIALIZE</a:t>
+            </a:r>
+          </a:p>
+          <a:p>
+            <a:pPr marL="0" indent="0">
+              <a:buNone/>
+            </a:pPr>
+            <a:r>
+              <a:rPr lang="en-US" sz="2000" dirty="0"/>
+              <a:t>MD(mu).</a:t>
+            </a:r>
+            <a:r>
+              <a:rPr lang="en-US" sz="2000" dirty="0" err="1"/>
+              <a:t>ExpData.log.Ttime</a:t>
+            </a:r>
+            <a:r>
+              <a:rPr lang="en-US" sz="2000" dirty="0"/>
+              <a:t> </a:t>
+            </a:r>
+            <a:r>
+              <a:rPr lang="en-US" sz="2000" dirty="0">
+                <a:solidFill>
+                  <a:schemeClr val="accent5"/>
+                </a:solidFill>
+              </a:rPr>
+              <a:t>Array of time log (time at which temperature is acquired) TO INITIALIZE</a:t>
+            </a:r>
+            <a:endParaRPr lang="en-US" sz="2000" dirty="0"/>
+          </a:p>
+          <a:p>
+            <a:pPr marL="0" indent="0">
+              <a:buNone/>
+            </a:pPr>
+            <a:r>
+              <a:rPr lang="en-US" sz="2000" dirty="0"/>
+              <a:t>MD(mu).</a:t>
+            </a:r>
+            <a:r>
+              <a:rPr lang="en-US" sz="2000" dirty="0" err="1"/>
+              <a:t>ExpData.log.BiasStatus</a:t>
+            </a:r>
+            <a:r>
+              <a:rPr lang="en-US" sz="2000" dirty="0"/>
+              <a:t>=[1 1 1 1 1 1] </a:t>
+            </a:r>
+            <a:r>
+              <a:rPr lang="en-US" sz="2000" dirty="0">
+                <a:solidFill>
+                  <a:schemeClr val="accent5"/>
+                </a:solidFill>
+              </a:rPr>
+              <a:t>Status to which bias is set at each time </a:t>
             </a:r>
             <a:r>
               <a:rPr lang="en-US" sz="2000" dirty="0" err="1">
@@ -2743,7 +2806,7 @@
                   <a:schemeClr val="accent5"/>
                 </a:solidFill>
               </a:rPr>
-              <a:t>startproc</a:t>
+              <a:t>startbiastime</a:t>
             </a:r>
             <a:r>
               <a:rPr lang="en-US" sz="2000" dirty="0">
@@ -2751,25 +2814,15 @@
                   <a:schemeClr val="accent5"/>
                 </a:solidFill>
               </a:rPr>
-              <a:t>)</a:t>
-            </a:r>
-            <a:endParaRPr lang="en-US" sz="2000" dirty="0"/>
-          </a:p>
-          <a:p>
-            <a:pPr marL="0" indent="0">
-              <a:buNone/>
-            </a:pPr>
-            <a:r>
-              <a:rPr lang="en-US" sz="2000" dirty="0"/>
-              <a:t>MD(mu).</a:t>
-            </a:r>
-            <a:r>
-              <a:rPr lang="en-US" sz="2000" dirty="0" err="1"/>
-              <a:t>ExpData.Setup.t_offset_value</a:t>
-            </a:r>
-            <a:r>
-              <a:rPr lang="en-US" sz="2000" dirty="0"/>
-              <a:t> </a:t>
+              <a:t> (1 if the pin is turned on for the duration of the steady-state cycle, </a:t>
+            </a:r>
+            <a:r>
+              <a:rPr lang="en-US" sz="2000" dirty="0" err="1">
+                <a:solidFill>
+                  <a:schemeClr val="accent5"/>
+                </a:solidFill>
+              </a:rPr>
+              <a:t>ie</a:t>
             </a:r>
             <a:r>
               <a:rPr lang="en-US" sz="2000" dirty="0">
@@ -2777,15 +2830,24 @@
                   <a:schemeClr val="accent5"/>
                 </a:solidFill>
               </a:rPr>
-              <a:t>unit of the time offset (to define in </a:t>
-            </a:r>
-            <a:r>
-              <a:rPr lang="en-US" sz="2000" dirty="0" err="1">
-                <a:solidFill>
-                  <a:schemeClr val="accent5"/>
-                </a:solidFill>
-              </a:rPr>
-              <a:t>startproc</a:t>
+              <a:t> bias is on)</a:t>
+            </a:r>
+          </a:p>
+          <a:p>
+            <a:pPr marL="0" indent="0">
+              <a:buNone/>
+            </a:pPr>
+            <a:r>
+              <a:rPr lang="en-US" sz="2000" dirty="0"/>
+              <a:t>MD(1).</a:t>
+            </a:r>
+            <a:r>
+              <a:rPr lang="en-US" sz="2000" dirty="0" err="1"/>
+              <a:t>ExpData.log.I</a:t>
+            </a:r>
+            <a:r>
+              <a:rPr lang="en-US" sz="2000" dirty="0"/>
+              <a:t> </a:t>
             </a:r>
             <a:r>
               <a:rPr lang="en-US" sz="2000" dirty="0">
@@ -2793,9 +2855,8 @@
                   <a:schemeClr val="accent5"/>
                 </a:solidFill>
               </a:rPr>
-              <a:t>)</a:t>
-            </a:r>
-            <a:endParaRPr lang="en-US" sz="2000" dirty="0"/>
+              <a:t>value of the current log from Keithley</a:t>
+            </a:r>
           </a:p>
           <a:p>
             <a:pPr marL="0" indent="0">
@@ -2803,11 +2864,11 @@
             </a:pPr>
             <a:r>
               <a:rPr lang="en-US" sz="2000" dirty="0"/>
-              <a:t>MD(mu).</a:t>
+              <a:t>MD(1).</a:t>
             </a:r>
             <a:r>
               <a:rPr lang="en-US" sz="2000" dirty="0" err="1"/>
-              <a:t>ExpData.Setup.stressBiasValue</a:t>
+              <a:t>ExpData.log.Itime</a:t>
             </a:r>
             <a:r>
               <a:rPr lang="en-US" sz="2000" dirty="0"/>
@@ -2819,7 +2880,7 @@
                   <a:schemeClr val="accent5"/>
                 </a:solidFill>
               </a:rPr>
-              <a:t>value of steady-state bias (needs to be the same for all hotplates)</a:t>
+              <a:t>Time at which current is acquired. Current is acquired independently from hotplate temperature, so need to be stored separately</a:t>
             </a:r>
           </a:p>
           <a:p>
@@ -2832,7 +2893,23 @@
             </a:r>
             <a:r>
               <a:rPr lang="en-US" sz="2000" dirty="0" err="1"/>
-              <a:t>ExpData.Setup.biastime_sec</a:t>
+              <a:t>ExpData.log.Pin</a:t>
+            </a:r>
+            <a:r>
+              <a:rPr lang="en-US" sz="2000" dirty="0"/>
+              <a:t>(</a:t>
+            </a:r>
+            <a:r>
+              <a:rPr lang="en-US" sz="2000" dirty="0" err="1"/>
+              <a:t>i</a:t>
+            </a:r>
+            <a:r>
+              <a:rPr lang="en-US" sz="2000" dirty="0"/>
+              <a:t>).</a:t>
+            </a:r>
+            <a:r>
+              <a:rPr lang="en-US" sz="2000" dirty="0" err="1"/>
+              <a:t>tCV</a:t>
             </a:r>
             <a:r>
               <a:rPr lang="en-US" sz="2000" dirty="0"/>
@@ -2841,26 +2918,12 @@
             <a:r>
               <a:rPr lang="en-US" sz="2000" dirty="0">
                 <a:solidFill>
-                  <a:schemeClr val="accent5"/>
+                  <a:schemeClr val="accent1">
+                    <a:lumMod val="75000"/>
+                  </a:schemeClr>
                 </a:solidFill>
               </a:rPr>
-              <a:t>steady-state bias time converted to s (defined in </a:t>
-            </a:r>
-            <a:r>
-              <a:rPr lang="en-US" sz="2000" dirty="0" err="1">
-                <a:solidFill>
-                  <a:schemeClr val="accent5"/>
-                </a:solidFill>
-              </a:rPr>
-              <a:t>startproc</a:t>
-            </a:r>
-            <a:r>
-              <a:rPr lang="en-US" sz="2000" dirty="0">
-                <a:solidFill>
-                  <a:schemeClr val="accent5"/>
-                </a:solidFill>
-              </a:rPr>
-              <a:t>)</a:t>
+              <a:t>vector containing the time at which each CV was measured (NEED TO ADD!)</a:t>
             </a:r>
           </a:p>
           <a:p>
@@ -2869,11 +2932,11 @@
             </a:pPr>
             <a:r>
               <a:rPr lang="en-US" sz="2000" dirty="0"/>
-              <a:t>MD(mu).</a:t>
+              <a:t>MD(mu).ExpData.log. </a:t>
             </a:r>
             <a:r>
               <a:rPr lang="en-US" sz="2000" dirty="0" err="1"/>
-              <a:t>ExpData.Setup.TempC</a:t>
+              <a:t>startbiastime</a:t>
             </a:r>
             <a:r>
               <a:rPr lang="en-US" sz="2000" dirty="0"/>
@@ -2882,26 +2945,32 @@
             <a:r>
               <a:rPr lang="en-US" sz="2000" dirty="0">
                 <a:solidFill>
-                  <a:schemeClr val="accent5"/>
+                  <a:schemeClr val="accent1">
+                    <a:lumMod val="75000"/>
+                  </a:schemeClr>
                 </a:solidFill>
               </a:rPr>
-              <a:t>cooling temperature (define in </a:t>
+              <a:t>vector containing the time at which bias was started on each unit (NEED TO ADD!). It contains the same values as MD(mu).</a:t>
             </a:r>
             <a:r>
               <a:rPr lang="en-US" sz="2000" dirty="0" err="1">
                 <a:solidFill>
-                  <a:schemeClr val="accent5"/>
+                  <a:schemeClr val="accent1">
+                    <a:lumMod val="75000"/>
+                  </a:schemeClr>
                 </a:solidFill>
               </a:rPr>
-              <a:t>startproc</a:t>
+              <a:t>MDdata.startbiastime</a:t>
             </a:r>
             <a:r>
               <a:rPr lang="en-US" sz="2000" dirty="0">
                 <a:solidFill>
-                  <a:schemeClr val="accent5"/>
+                  <a:schemeClr val="accent1">
+                    <a:lumMod val="75000"/>
+                  </a:schemeClr>
                 </a:solidFill>
               </a:rPr>
-              <a:t>)</a:t>
+              <a:t>.</a:t>
             </a:r>
           </a:p>
           <a:p>
@@ -2914,7 +2983,7 @@
             </a:r>
             <a:r>
               <a:rPr lang="en-US" sz="2000" dirty="0" err="1"/>
-              <a:t>ExpData.Setup.TempH</a:t>
+              <a:t>ExpData.log.endBiasTime</a:t>
             </a:r>
             <a:r>
               <a:rPr lang="en-US" sz="2000" dirty="0"/>
@@ -2923,111 +2992,13 @@
             <a:r>
               <a:rPr lang="en-US" sz="2000" dirty="0">
                 <a:solidFill>
-                  <a:schemeClr val="accent5"/>
+                  <a:schemeClr val="accent1">
+                    <a:lumMod val="75000"/>
+                  </a:schemeClr>
                 </a:solidFill>
               </a:rPr>
-              <a:t>stress temperature (define in </a:t>
-            </a:r>
-            <a:r>
-              <a:rPr lang="en-US" sz="2000" dirty="0" err="1">
-                <a:solidFill>
-                  <a:schemeClr val="accent5"/>
-                </a:solidFill>
-              </a:rPr>
-              <a:t>startproc</a:t>
-            </a:r>
-            <a:r>
-              <a:rPr lang="en-US" sz="2000" dirty="0">
-                <a:solidFill>
-                  <a:schemeClr val="accent5"/>
-                </a:solidFill>
-              </a:rPr>
-              <a:t>)</a:t>
-            </a:r>
-          </a:p>
-          <a:p>
-            <a:pPr marL="0" indent="0">
-              <a:buNone/>
-            </a:pPr>
-            <a:r>
-              <a:rPr lang="en-US" sz="2000" dirty="0"/>
-              <a:t>MD(mu).</a:t>
-            </a:r>
-            <a:r>
-              <a:rPr lang="en-US" sz="2000" dirty="0" err="1"/>
-              <a:t>ExpData.Setup.CalTempH</a:t>
-            </a:r>
-            <a:r>
-              <a:rPr lang="en-US" sz="2000" dirty="0"/>
-              <a:t> </a:t>
-            </a:r>
-            <a:r>
-              <a:rPr lang="en-US" sz="2000" dirty="0">
-                <a:solidFill>
-                  <a:schemeClr val="accent5"/>
-                </a:solidFill>
-              </a:rPr>
-              <a:t>stress temperature corrected with calibration curve (defined in </a:t>
-            </a:r>
-            <a:r>
-              <a:rPr lang="en-US" sz="2000" dirty="0" err="1">
-                <a:solidFill>
-                  <a:schemeClr val="accent5"/>
-                </a:solidFill>
-              </a:rPr>
-              <a:t>startproc</a:t>
-            </a:r>
-            <a:r>
-              <a:rPr lang="en-US" sz="2000" dirty="0">
-                <a:solidFill>
-                  <a:schemeClr val="accent5"/>
-                </a:solidFill>
-              </a:rPr>
-              <a:t>)</a:t>
-            </a:r>
-            <a:endParaRPr lang="en-US" sz="2000" dirty="0"/>
-          </a:p>
-          <a:p>
-            <a:pPr marL="0" indent="0">
-              <a:buNone/>
-            </a:pPr>
-            <a:r>
-              <a:rPr lang="en-US" sz="2000" dirty="0"/>
-              <a:t>MD(mu).</a:t>
-            </a:r>
-            <a:r>
-              <a:rPr lang="en-US" sz="2000" dirty="0" err="1"/>
-              <a:t>ExpData.Setup.CalTempC</a:t>
-            </a:r>
-            <a:r>
-              <a:rPr lang="en-US" sz="2000" dirty="0"/>
-              <a:t> </a:t>
-            </a:r>
-            <a:r>
-              <a:rPr lang="en-US" sz="2000" dirty="0">
-                <a:solidFill>
-                  <a:schemeClr val="accent5"/>
-                </a:solidFill>
-              </a:rPr>
-              <a:t>cool temperature corrected with calibration curve (defined in </a:t>
-            </a:r>
-            <a:r>
-              <a:rPr lang="en-US" sz="2000" dirty="0" err="1">
-                <a:solidFill>
-                  <a:schemeClr val="accent5"/>
-                </a:solidFill>
-              </a:rPr>
-              <a:t>startproc</a:t>
-            </a:r>
-            <a:r>
-              <a:rPr lang="en-US" sz="2000" dirty="0">
-                <a:solidFill>
-                  <a:schemeClr val="accent5"/>
-                </a:solidFill>
-              </a:rPr>
-              <a:t>)</a:t>
-            </a:r>
-            <a:endParaRPr lang="en-US" sz="2000" dirty="0"/>
+              <a:t>vector containing the time at which stress bias was completed on each unit.</a:t>
+            </a:r>
           </a:p>
           <a:p>
             <a:pPr marL="0" indent="0">
@@ -3063,7 +3034,7 @@
     </p:spTree>
     <p:extLst>
       <p:ext uri="{BB962C8B-B14F-4D97-AF65-F5344CB8AC3E}">
-        <p14:creationId xmlns:p14="http://schemas.microsoft.com/office/powerpoint/2010/main" val="2558989793"/>
+        <p14:creationId xmlns:p14="http://schemas.microsoft.com/office/powerpoint/2010/main" val="95613213"/>
       </p:ext>
     </p:extLst>
   </p:cSld>
@@ -3095,7 +3066,7 @@
           <p:cNvPr id="2" name="Title 1">
             <a:extLst>
               <a:ext uri="{FF2B5EF4-FFF2-40B4-BE49-F238E27FC236}">
-                <a16:creationId xmlns:a16="http://schemas.microsoft.com/office/drawing/2014/main" id="{25657165-3D24-459B-A014-7CFEE0E35114}"/>
+                <a16:creationId xmlns:a16="http://schemas.microsoft.com/office/drawing/2014/main" id="{B6C8F8FC-BE2F-41CB-9262-6770DD2C529A}"/>
               </a:ext>
             </a:extLst>
           </p:cNvPr>
@@ -3120,7 +3091,7 @@
           <p:cNvPr id="3" name="Content Placeholder 2">
             <a:extLst>
               <a:ext uri="{FF2B5EF4-FFF2-40B4-BE49-F238E27FC236}">
-                <a16:creationId xmlns:a16="http://schemas.microsoft.com/office/drawing/2014/main" id="{BB941BF2-51B4-45D6-9B4B-93C159A40C53}"/>
+                <a16:creationId xmlns:a16="http://schemas.microsoft.com/office/drawing/2014/main" id="{DA60CCF4-7835-403B-9A2F-5156BCD3EFB6}"/>
               </a:ext>
             </a:extLst>
           </p:cNvPr>
@@ -3133,13 +3104,13 @@
         </p:nvSpPr>
         <p:spPr>
           <a:xfrm>
-            <a:off x="232558" y="802965"/>
-            <a:ext cx="11959442" cy="5428869"/>
+            <a:off x="109330" y="1162878"/>
+            <a:ext cx="12198440" cy="3816625"/>
           </a:xfrm>
         </p:spPr>
         <p:txBody>
           <a:bodyPr>
-            <a:normAutofit fontScale="92500"/>
+            <a:normAutofit fontScale="70000" lnSpcReduction="20000"/>
           </a:bodyPr>
           <a:lstStyle/>
           <a:p>
@@ -3147,7 +3118,7 @@
               <a:buNone/>
             </a:pPr>
             <a:r>
-              <a:rPr lang="en-US" sz="2000" u="sng" dirty="0"/>
+              <a:rPr lang="en-US" u="sng" dirty="0"/>
               <a:t>Main arguments (continued)</a:t>
             </a:r>
           </a:p>
@@ -3155,70 +3126,75 @@
             <a:pPr marL="0" indent="0">
               <a:buNone/>
             </a:pPr>
-            <a:r>
-              <a:rPr lang="en-US" sz="2000" b="1" dirty="0"/>
-              <a:t>MD structure (Measurement Data)</a:t>
-            </a:r>
-          </a:p>
-          <a:p>
-            <a:r>
-              <a:rPr lang="en-US" sz="2000" b="1" dirty="0" err="1"/>
-              <a:t>ExpData</a:t>
-            </a:r>
-            <a:r>
-              <a:rPr lang="en-US" sz="2000" b="1" dirty="0"/>
-              <a:t> contains the experimentally measured data and log data</a:t>
-            </a:r>
+            <a:endParaRPr lang="en-US" u="sng" dirty="0"/>
           </a:p>
           <a:p>
             <a:pPr marL="0" indent="0">
               <a:buNone/>
             </a:pPr>
             <a:r>
-              <a:rPr lang="en-US" sz="2000" dirty="0"/>
-              <a:t>MD(mu).</a:t>
-            </a:r>
-            <a:r>
-              <a:rPr lang="en-US" sz="2000" dirty="0" err="1"/>
-              <a:t>ExpData.Setup.IterM</a:t>
-            </a:r>
-            <a:r>
-              <a:rPr lang="en-US" sz="2000" dirty="0"/>
-              <a:t> </a:t>
-            </a:r>
-            <a:r>
-              <a:rPr lang="en-US" sz="2000" dirty="0">
+              <a:rPr lang="en-US" b="1" dirty="0" err="1"/>
+              <a:t>MD_plot</a:t>
+            </a:r>
+            <a:r>
+              <a:rPr lang="en-US" b="1" dirty="0"/>
+              <a:t> structure</a:t>
+            </a:r>
+          </a:p>
+          <a:p>
+            <a:r>
+              <a:rPr lang="en-US" b="1" dirty="0"/>
+              <a:t>Plots contains the figure handles for each pin (need to be defined at beginning of </a:t>
+            </a:r>
+            <a:r>
+              <a:rPr lang="en-US" b="1" dirty="0" err="1"/>
+              <a:t>StartProc</a:t>
+            </a:r>
+            <a:r>
+              <a:rPr lang="en-US" b="1" dirty="0"/>
+              <a:t>)</a:t>
+            </a:r>
+          </a:p>
+          <a:p>
+            <a:pPr marL="0" indent="0">
+              <a:buNone/>
+            </a:pPr>
+            <a:r>
+              <a:rPr lang="en-US" dirty="0" err="1"/>
+              <a:t>MD_plot</a:t>
+            </a:r>
+            <a:r>
+              <a:rPr lang="en-US" dirty="0"/>
+              <a:t>(mu).Plots.CV </a:t>
+            </a:r>
+            <a:r>
+              <a:rPr lang="en-US" dirty="0">
                 <a:solidFill>
                   <a:schemeClr val="accent5"/>
                 </a:solidFill>
               </a:rPr>
-              <a:t>Number of repeated measurements per iteration</a:t>
-            </a:r>
-            <a:endParaRPr lang="en-US" sz="2000" dirty="0"/>
+              <a:t>Object array that contains the handles to the CV plots for each pin of Measurement Unit n</a:t>
+            </a:r>
           </a:p>
           <a:p>
             <a:pPr marL="0" indent="0">
               <a:buNone/>
             </a:pPr>
             <a:r>
-              <a:rPr lang="en-US" sz="2000" dirty="0"/>
-              <a:t>MD(mu).</a:t>
-            </a:r>
-            <a:r>
-              <a:rPr lang="en-US" sz="2000" dirty="0" err="1"/>
-              <a:t>ExpData.log.T</a:t>
-            </a:r>
-            <a:r>
-              <a:rPr lang="en-US" sz="2000" dirty="0"/>
-              <a:t> </a:t>
-            </a:r>
-            <a:r>
-              <a:rPr lang="en-US" sz="2000" dirty="0">
+              <a:rPr lang="en-US" dirty="0" err="1"/>
+              <a:t>MD_plot</a:t>
+            </a:r>
+            <a:r>
+              <a:rPr lang="en-US" dirty="0"/>
+              <a:t>(mu).Plots.CVby2 </a:t>
+            </a:r>
+            <a:r>
+              <a:rPr lang="en-US" dirty="0">
                 <a:solidFill>
                   <a:schemeClr val="accent5"/>
                 </a:solidFill>
               </a:rPr>
-              <a:t>Array of temperature log (different for each MU) TO INITIALIZE</a:t>
+              <a:t>Object array that contains the handles to the CV derivative plots for each pin of MU n</a:t>
             </a:r>
           </a:p>
           <a:p>
@@ -3226,286 +3202,100 @@
               <a:buNone/>
             </a:pPr>
             <a:r>
-              <a:rPr lang="en-US" sz="2000" dirty="0"/>
-              <a:t>MD(mu).</a:t>
-            </a:r>
-            <a:r>
-              <a:rPr lang="en-US" sz="2000" dirty="0" err="1"/>
-              <a:t>ExpData.log.Ttime</a:t>
-            </a:r>
-            <a:r>
-              <a:rPr lang="en-US" sz="2000" dirty="0"/>
+              <a:rPr lang="en-US" dirty="0" err="1"/>
+              <a:t>MD_plot</a:t>
+            </a:r>
+            <a:r>
+              <a:rPr lang="en-US" dirty="0"/>
+              <a:t>(mu).</a:t>
+            </a:r>
+            <a:r>
+              <a:rPr lang="en-US" dirty="0" err="1"/>
+              <a:t>Plots.Temp</a:t>
+            </a:r>
+            <a:r>
+              <a:rPr lang="en-US" dirty="0"/>
               <a:t> </a:t>
             </a:r>
             <a:r>
-              <a:rPr lang="en-US" sz="2000" dirty="0">
+              <a:rPr lang="en-US" dirty="0">
                 <a:solidFill>
                   <a:schemeClr val="accent5"/>
                 </a:solidFill>
               </a:rPr>
-              <a:t>Array of time log (time at which temperature is acquired) TO INITIALIZE</a:t>
-            </a:r>
-            <a:endParaRPr lang="en-US" sz="2000" dirty="0"/>
+              <a:t>Object array that contains the temperature plot handle</a:t>
+            </a:r>
           </a:p>
           <a:p>
             <a:pPr marL="0" indent="0">
               <a:buNone/>
             </a:pPr>
             <a:r>
-              <a:rPr lang="en-US" sz="2000" dirty="0"/>
-              <a:t>MD(mu).</a:t>
-            </a:r>
-            <a:r>
-              <a:rPr lang="en-US" sz="2000" dirty="0" err="1"/>
-              <a:t>ExpData.log.BiasStatus</a:t>
-            </a:r>
-            <a:r>
-              <a:rPr lang="en-US" sz="2000" dirty="0"/>
-              <a:t>=[1 1 1 1 1 1] </a:t>
-            </a:r>
-            <a:r>
-              <a:rPr lang="en-US" sz="2000" dirty="0">
+              <a:rPr lang="en-US" dirty="0" err="1"/>
+              <a:t>MD_plot</a:t>
+            </a:r>
+            <a:r>
+              <a:rPr lang="en-US" dirty="0"/>
+              <a:t>(mu).</a:t>
+            </a:r>
+            <a:r>
+              <a:rPr lang="en-US" dirty="0" err="1"/>
+              <a:t>Plots.Current</a:t>
+            </a:r>
+            <a:r>
+              <a:rPr lang="en-US" dirty="0"/>
+              <a:t> </a:t>
+            </a:r>
+            <a:r>
+              <a:rPr lang="en-US" dirty="0">
                 <a:solidFill>
                   <a:schemeClr val="accent5"/>
                 </a:solidFill>
               </a:rPr>
-              <a:t>Status to which bias is set at each time </a:t>
-            </a:r>
-            <a:r>
-              <a:rPr lang="en-US" sz="2000" dirty="0" err="1">
+              <a:t>Object array that contains the plot handle of the current measured by the Keithley for all pins</a:t>
+            </a:r>
+          </a:p>
+          <a:p>
+            <a:pPr marL="0" indent="0">
+              <a:buNone/>
+            </a:pPr>
+            <a:r>
+              <a:rPr lang="en-US" dirty="0" err="1"/>
+              <a:t>MD_plot</a:t>
+            </a:r>
+            <a:r>
+              <a:rPr lang="en-US" dirty="0"/>
+              <a:t>(mu).</a:t>
+            </a:r>
+            <a:r>
+              <a:rPr lang="en-US" dirty="0" err="1"/>
+              <a:t>Plots.VfbTime</a:t>
+            </a:r>
+            <a:r>
+              <a:rPr lang="en-US" dirty="0"/>
+              <a:t> </a:t>
+            </a:r>
+            <a:r>
+              <a:rPr lang="en-US" dirty="0">
                 <a:solidFill>
                   <a:schemeClr val="accent5"/>
                 </a:solidFill>
               </a:rPr>
-              <a:t>startbiastime</a:t>
-            </a:r>
-            <a:r>
-              <a:rPr lang="en-US" sz="2000" dirty="0">
-                <a:solidFill>
-                  <a:schemeClr val="accent5"/>
-                </a:solidFill>
-              </a:rPr>
-              <a:t> (1 if the pin is turned on for the duration of the steady-state cycle, </a:t>
-            </a:r>
-            <a:r>
-              <a:rPr lang="en-US" sz="2000" dirty="0" err="1">
-                <a:solidFill>
-                  <a:schemeClr val="accent5"/>
-                </a:solidFill>
-              </a:rPr>
-              <a:t>ie</a:t>
-            </a:r>
-            <a:r>
-              <a:rPr lang="en-US" sz="2000" dirty="0">
-                <a:solidFill>
-                  <a:schemeClr val="accent5"/>
-                </a:solidFill>
-              </a:rPr>
-              <a:t> bias is on)</a:t>
+              <a:t>Object array that contains the flatband vs time plot handle</a:t>
             </a:r>
           </a:p>
           <a:p>
             <a:pPr marL="0" indent="0">
               <a:buNone/>
             </a:pPr>
-            <a:r>
-              <a:rPr lang="en-US" sz="2000" dirty="0"/>
-              <a:t>MD(1).</a:t>
-            </a:r>
-            <a:r>
-              <a:rPr lang="en-US" sz="2000" dirty="0" err="1"/>
-              <a:t>ExpData.log.I</a:t>
-            </a:r>
-            <a:r>
-              <a:rPr lang="en-US" sz="2000" dirty="0"/>
-              <a:t> </a:t>
-            </a:r>
-            <a:r>
-              <a:rPr lang="en-US" sz="2000" dirty="0">
-                <a:solidFill>
-                  <a:schemeClr val="accent5"/>
-                </a:solidFill>
-              </a:rPr>
-              <a:t>value of the current log from Keithley</a:t>
-            </a:r>
-          </a:p>
-          <a:p>
-            <a:pPr marL="0" indent="0">
-              <a:buNone/>
-            </a:pPr>
-            <a:r>
-              <a:rPr lang="en-US" sz="2000" dirty="0"/>
-              <a:t>MD(1).</a:t>
-            </a:r>
-            <a:r>
-              <a:rPr lang="en-US" sz="2000" dirty="0" err="1"/>
-              <a:t>ExpData.log.Itime</a:t>
-            </a:r>
-            <a:r>
-              <a:rPr lang="en-US" sz="2000" dirty="0"/>
-              <a:t> </a:t>
-            </a:r>
-            <a:r>
-              <a:rPr lang="en-US" sz="2000" dirty="0">
-                <a:solidFill>
-                  <a:schemeClr val="accent5"/>
-                </a:solidFill>
-              </a:rPr>
-              <a:t>Time at which current is acquired. Current is acquired independently from hotplate temperature, so need to be stored separately</a:t>
-            </a:r>
-          </a:p>
-          <a:p>
-            <a:pPr marL="0" indent="0">
-              <a:buNone/>
-            </a:pPr>
-            <a:r>
-              <a:rPr lang="en-US" sz="2000" dirty="0"/>
-              <a:t>MD(mu).</a:t>
-            </a:r>
-            <a:r>
-              <a:rPr lang="en-US" sz="2000" dirty="0" err="1"/>
-              <a:t>ExpData.log.Pin</a:t>
-            </a:r>
-            <a:r>
-              <a:rPr lang="en-US" sz="2000" dirty="0"/>
-              <a:t>(</a:t>
-            </a:r>
-            <a:r>
-              <a:rPr lang="en-US" sz="2000" dirty="0" err="1"/>
-              <a:t>i</a:t>
-            </a:r>
-            <a:r>
-              <a:rPr lang="en-US" sz="2000" dirty="0"/>
-              <a:t>).</a:t>
-            </a:r>
-            <a:r>
-              <a:rPr lang="en-US" sz="2000" dirty="0" err="1"/>
-              <a:t>tCV</a:t>
-            </a:r>
-            <a:r>
-              <a:rPr lang="en-US" sz="2000" dirty="0"/>
-              <a:t> </a:t>
-            </a:r>
-            <a:r>
-              <a:rPr lang="en-US" sz="2000" dirty="0">
-                <a:solidFill>
-                  <a:schemeClr val="accent1">
-                    <a:lumMod val="75000"/>
-                  </a:schemeClr>
-                </a:solidFill>
-              </a:rPr>
-              <a:t>vector containing the time at which each CV was measured (NEED TO ADD!)</a:t>
-            </a:r>
-          </a:p>
-          <a:p>
-            <a:pPr marL="0" indent="0">
-              <a:buNone/>
-            </a:pPr>
-            <a:r>
-              <a:rPr lang="en-US" sz="2000" dirty="0"/>
-              <a:t>MD(mu).ExpData.log. </a:t>
-            </a:r>
-            <a:r>
-              <a:rPr lang="en-US" sz="2000" dirty="0" err="1"/>
-              <a:t>startbiastime</a:t>
-            </a:r>
-            <a:r>
-              <a:rPr lang="en-US" sz="2000" dirty="0"/>
-              <a:t> </a:t>
-            </a:r>
-            <a:r>
-              <a:rPr lang="en-US" sz="2000" dirty="0">
-                <a:solidFill>
-                  <a:schemeClr val="accent1">
-                    <a:lumMod val="75000"/>
-                  </a:schemeClr>
-                </a:solidFill>
-              </a:rPr>
-              <a:t>vector containing the time at which bias was started on each unit (NEED TO ADD!). It contains the same values as MD(mu).</a:t>
-            </a:r>
-            <a:r>
-              <a:rPr lang="en-US" sz="2000" dirty="0" err="1">
-                <a:solidFill>
-                  <a:schemeClr val="accent1">
-                    <a:lumMod val="75000"/>
-                  </a:schemeClr>
-                </a:solidFill>
-              </a:rPr>
-              <a:t>MDdata.startbiastime</a:t>
-            </a:r>
-            <a:r>
-              <a:rPr lang="en-US" sz="2000" dirty="0">
-                <a:solidFill>
-                  <a:schemeClr val="accent1">
-                    <a:lumMod val="75000"/>
-                  </a:schemeClr>
-                </a:solidFill>
-              </a:rPr>
-              <a:t>.</a:t>
-            </a:r>
-          </a:p>
-          <a:p>
-            <a:pPr marL="0" indent="0">
-              <a:buNone/>
-            </a:pPr>
-            <a:r>
-              <a:rPr lang="en-US" sz="2000" dirty="0"/>
-              <a:t>MD(mu).</a:t>
-            </a:r>
-            <a:r>
-              <a:rPr lang="en-US" sz="2000" dirty="0" err="1"/>
-              <a:t>ExpData.log.endBiasTime</a:t>
-            </a:r>
-            <a:r>
-              <a:rPr lang="en-US" sz="2000" dirty="0"/>
-              <a:t> </a:t>
-            </a:r>
-            <a:r>
-              <a:rPr lang="en-US" sz="2000" dirty="0">
-                <a:solidFill>
-                  <a:schemeClr val="accent1">
-                    <a:lumMod val="75000"/>
-                  </a:schemeClr>
-                </a:solidFill>
-              </a:rPr>
-              <a:t>vector containing the time at which stress bias was completed on each unit.</a:t>
-            </a:r>
-          </a:p>
-          <a:p>
-            <a:pPr marL="0" indent="0">
-              <a:buNone/>
-            </a:pPr>
-            <a:endParaRPr lang="en-US" sz="2000" dirty="0">
-              <a:solidFill>
-                <a:schemeClr val="accent5"/>
-              </a:solidFill>
-            </a:endParaRPr>
-          </a:p>
-          <a:p>
-            <a:pPr marL="0" indent="0">
-              <a:buNone/>
-            </a:pPr>
-            <a:endParaRPr lang="en-US" sz="2000" dirty="0">
-              <a:solidFill>
-                <a:schemeClr val="accent5"/>
-              </a:solidFill>
-            </a:endParaRPr>
-          </a:p>
-          <a:p>
-            <a:pPr marL="0" indent="0">
-              <a:buNone/>
-            </a:pPr>
-            <a:endParaRPr lang="en-US" sz="2000" dirty="0"/>
-          </a:p>
-          <a:p>
-            <a:endParaRPr lang="en-US" sz="2000" dirty="0"/>
+            <a:endParaRPr lang="en-US" dirty="0"/>
           </a:p>
         </p:txBody>
       </p:sp>
     </p:spTree>
     <p:extLst>
       <p:ext uri="{BB962C8B-B14F-4D97-AF65-F5344CB8AC3E}">
-        <p14:creationId xmlns:p14="http://schemas.microsoft.com/office/powerpoint/2010/main" val="95613213"/>
+        <p14:creationId xmlns:p14="http://schemas.microsoft.com/office/powerpoint/2010/main" val="3479373720"/>
       </p:ext>
     </p:extLst>
   </p:cSld>
@@ -19143,7 +18933,7 @@
           <p:cNvPr id="2" name="Title 1">
             <a:extLst>
               <a:ext uri="{FF2B5EF4-FFF2-40B4-BE49-F238E27FC236}">
-                <a16:creationId xmlns:a16="http://schemas.microsoft.com/office/drawing/2014/main" id="{B6C8F8FC-BE2F-41CB-9262-6770DD2C529A}"/>
+                <a16:creationId xmlns:a16="http://schemas.microsoft.com/office/drawing/2014/main" id="{25657165-3D24-459B-A014-7CFEE0E35114}"/>
               </a:ext>
             </a:extLst>
           </p:cNvPr>
@@ -19159,7 +18949,10 @@
           <a:bodyPr/>
           <a:lstStyle/>
           <a:p>
-            <a:endParaRPr lang="en-US"/>
+            <a:r>
+              <a:rPr lang="en-US" dirty="0"/>
+              <a:t> </a:t>
+            </a:r>
           </a:p>
         </p:txBody>
       </p:sp>
@@ -19168,7 +18961,7 @@
           <p:cNvPr id="3" name="Content Placeholder 2">
             <a:extLst>
               <a:ext uri="{FF2B5EF4-FFF2-40B4-BE49-F238E27FC236}">
-                <a16:creationId xmlns:a16="http://schemas.microsoft.com/office/drawing/2014/main" id="{DA60CCF4-7835-403B-9A2F-5156BCD3EFB6}"/>
+                <a16:creationId xmlns:a16="http://schemas.microsoft.com/office/drawing/2014/main" id="{BB941BF2-51B4-45D6-9B4B-93C159A40C53}"/>
               </a:ext>
             </a:extLst>
           </p:cNvPr>
@@ -19181,13 +18974,13 @@
         </p:nvSpPr>
         <p:spPr>
           <a:xfrm>
-            <a:off x="109330" y="1162878"/>
-            <a:ext cx="12198440" cy="3816625"/>
+            <a:off x="232558" y="802965"/>
+            <a:ext cx="11959442" cy="5428869"/>
           </a:xfrm>
         </p:spPr>
         <p:txBody>
           <a:bodyPr>
-            <a:normAutofit fontScale="70000" lnSpcReduction="20000"/>
+            <a:normAutofit lnSpcReduction="10000"/>
           </a:bodyPr>
           <a:lstStyle/>
           <a:p>
@@ -19195,7 +18988,7 @@
               <a:buNone/>
             </a:pPr>
             <a:r>
-              <a:rPr lang="en-US" u="sng" dirty="0"/>
+              <a:rPr lang="en-US" sz="2000" u="sng" dirty="0"/>
               <a:t>Main arguments (continued)</a:t>
             </a:r>
           </a:p>
@@ -19203,49 +18996,52 @@
             <a:pPr marL="0" indent="0">
               <a:buNone/>
             </a:pPr>
-            <a:endParaRPr lang="en-US" u="sng" dirty="0"/>
+            <a:r>
+              <a:rPr lang="en-US" sz="2000" b="1" dirty="0"/>
+              <a:t>MD structure (Measurement Data)</a:t>
+            </a:r>
+          </a:p>
+          <a:p>
+            <a:r>
+              <a:rPr lang="en-US" sz="2000" b="1" dirty="0" err="1"/>
+              <a:t>ExpData</a:t>
+            </a:r>
+            <a:r>
+              <a:rPr lang="en-US" sz="2000" b="1" dirty="0"/>
+              <a:t> contains the experimentally measured data and log data</a:t>
+            </a:r>
           </a:p>
           <a:p>
             <a:pPr marL="0" indent="0">
               <a:buNone/>
             </a:pPr>
             <a:r>
-              <a:rPr lang="en-US" b="1" dirty="0"/>
-              <a:t>MD structure (Measurement Data)</a:t>
-            </a:r>
-          </a:p>
-          <a:p>
-            <a:endParaRPr lang="en-US" b="1" dirty="0"/>
-          </a:p>
-          <a:p>
-            <a:r>
-              <a:rPr lang="en-US" b="1" dirty="0"/>
-              <a:t>Plots contains the figure handles for each pin (need to be defined at beginning of </a:t>
-            </a:r>
-            <a:r>
-              <a:rPr lang="en-US" b="1" dirty="0" err="1"/>
-              <a:t>StartProc</a:t>
-            </a:r>
-            <a:r>
-              <a:rPr lang="en-US" b="1" dirty="0"/>
-              <a:t>)</a:t>
-            </a:r>
-          </a:p>
-          <a:p>
-            <a:pPr marL="0" indent="0">
-              <a:buNone/>
-            </a:pPr>
-            <a:r>
-              <a:rPr lang="en-US" dirty="0"/>
-              <a:t>MD(mu).Plots.CV </a:t>
-            </a:r>
-            <a:r>
-              <a:rPr lang="en-US" dirty="0">
+              <a:rPr lang="en-US" sz="2000" dirty="0"/>
+              <a:t>MD(mu).</a:t>
+            </a:r>
+            <a:r>
+              <a:rPr lang="en-US" sz="2000" dirty="0" err="1"/>
+              <a:t>ExpData.Pin</a:t>
+            </a:r>
+            <a:r>
+              <a:rPr lang="en-US" sz="2000" dirty="0"/>
+              <a:t>(</a:t>
+            </a:r>
+            <a:r>
+              <a:rPr lang="en-US" sz="2000" dirty="0" err="1"/>
+              <a:t>i</a:t>
+            </a:r>
+            <a:r>
+              <a:rPr lang="en-US" sz="2000" dirty="0"/>
+              <a:t>).C </a:t>
+            </a:r>
+            <a:r>
+              <a:rPr lang="en-US" sz="2000" dirty="0">
                 <a:solidFill>
                   <a:schemeClr val="accent5"/>
                 </a:solidFill>
               </a:rPr>
-              <a:t>Object array that contains the handles to the CV plots for each pin of Measurement Unit n</a:t>
+              <a:t>matrix containing the capacitance measurement data for hotplate n and pin i</a:t>
             </a:r>
           </a:p>
           <a:p>
@@ -19253,16 +19049,32 @@
               <a:buNone/>
             </a:pPr>
             <a:r>
-              <a:rPr lang="en-US" dirty="0"/>
-              <a:t>MD(mu).Plots.CVby2 </a:t>
-            </a:r>
-            <a:r>
-              <a:rPr lang="en-US" dirty="0">
+              <a:rPr lang="en-US" sz="2000" dirty="0"/>
+              <a:t>MD(mu).</a:t>
+            </a:r>
+            <a:r>
+              <a:rPr lang="en-US" sz="2000" dirty="0" err="1"/>
+              <a:t>ExpData.Pin</a:t>
+            </a:r>
+            <a:r>
+              <a:rPr lang="en-US" sz="2000" dirty="0"/>
+              <a:t>(</a:t>
+            </a:r>
+            <a:r>
+              <a:rPr lang="en-US" sz="2000" dirty="0" err="1"/>
+              <a:t>i</a:t>
+            </a:r>
+            <a:r>
+              <a:rPr lang="en-US" sz="2000" dirty="0"/>
+              <a:t>).V </a:t>
+            </a:r>
+            <a:r>
+              <a:rPr lang="en-US" sz="2000" dirty="0">
                 <a:solidFill>
                   <a:schemeClr val="accent5"/>
                 </a:solidFill>
               </a:rPr>
-              <a:t>Object array that contains the handles to the CV derivative plots for each pin of MU n</a:t>
+              <a:t>matrix containing the voltage measurement data for hotplate n and pin I</a:t>
             </a:r>
           </a:p>
           <a:p>
@@ -19270,24 +19082,32 @@
               <a:buNone/>
             </a:pPr>
             <a:r>
-              <a:rPr lang="en-US" dirty="0"/>
+              <a:rPr lang="en-US" sz="2000" dirty="0"/>
               <a:t>MD(mu).</a:t>
             </a:r>
             <a:r>
-              <a:rPr lang="en-US" dirty="0" err="1"/>
-              <a:t>Plots.Temp</a:t>
-            </a:r>
-            <a:r>
-              <a:rPr lang="en-US" dirty="0"/>
-              <a:t> </a:t>
-            </a:r>
-            <a:r>
-              <a:rPr lang="en-US" dirty="0">
+              <a:rPr lang="en-US" sz="2000" dirty="0" err="1"/>
+              <a:t>ExpData.Pin</a:t>
+            </a:r>
+            <a:r>
+              <a:rPr lang="en-US" sz="2000" dirty="0"/>
+              <a:t>(</a:t>
+            </a:r>
+            <a:r>
+              <a:rPr lang="en-US" sz="2000" dirty="0" err="1"/>
+              <a:t>i</a:t>
+            </a:r>
+            <a:r>
+              <a:rPr lang="en-US" sz="2000" dirty="0"/>
+              <a:t>).R </a:t>
+            </a:r>
+            <a:r>
+              <a:rPr lang="en-US" sz="2000" dirty="0">
                 <a:solidFill>
                   <a:schemeClr val="accent5"/>
                 </a:solidFill>
               </a:rPr>
-              <a:t>Object array that contains the temperature plot handle</a:t>
+              <a:t>matrix containing the resistance measurement data for hotplate n and pin I</a:t>
             </a:r>
           </a:p>
           <a:p>
@@ -19295,24 +19115,83 @@
               <a:buNone/>
             </a:pPr>
             <a:r>
-              <a:rPr lang="en-US" dirty="0"/>
+              <a:rPr lang="en-US" sz="2000" dirty="0"/>
               <a:t>MD(mu).</a:t>
             </a:r>
             <a:r>
-              <a:rPr lang="en-US" dirty="0" err="1"/>
-              <a:t>Plots.Current</a:t>
-            </a:r>
-            <a:r>
-              <a:rPr lang="en-US" dirty="0"/>
+              <a:rPr lang="en-US" sz="2000" dirty="0" err="1"/>
+              <a:t>ExpData.Pin</a:t>
+            </a:r>
+            <a:r>
+              <a:rPr lang="en-US" sz="2000" dirty="0"/>
+              <a:t>(</a:t>
+            </a:r>
+            <a:r>
+              <a:rPr lang="en-US" sz="2000" dirty="0" err="1"/>
+              <a:t>i</a:t>
+            </a:r>
+            <a:r>
+              <a:rPr lang="en-US" sz="2000" dirty="0"/>
+              <a:t>).</a:t>
+            </a:r>
+            <a:r>
+              <a:rPr lang="en-US" sz="2000" dirty="0" err="1"/>
+              <a:t>Vinput</a:t>
+            </a:r>
+            <a:r>
+              <a:rPr lang="en-US" sz="2000" dirty="0"/>
               <a:t> </a:t>
             </a:r>
             <a:r>
-              <a:rPr lang="en-US" dirty="0">
+              <a:rPr lang="en-US" sz="2000" dirty="0">
+                <a:solidFill>
+                  <a:schemeClr val="accent1">
+                    <a:lumMod val="75000"/>
+                  </a:schemeClr>
+                </a:solidFill>
+              </a:rPr>
+              <a:t>vector containing the user-defined voltage parameters on the app panel</a:t>
+            </a:r>
+          </a:p>
+          <a:p>
+            <a:pPr marL="0" indent="0">
+              <a:buNone/>
+            </a:pPr>
+            <a:r>
+              <a:rPr lang="en-US" sz="2000" dirty="0"/>
+              <a:t>MD(mu).</a:t>
+            </a:r>
+            <a:r>
+              <a:rPr lang="en-US" sz="2000" dirty="0" err="1"/>
+              <a:t>ExpData.Pin</a:t>
+            </a:r>
+            <a:r>
+              <a:rPr lang="en-US" sz="2000" dirty="0"/>
+              <a:t>(</a:t>
+            </a:r>
+            <a:r>
+              <a:rPr lang="en-US" sz="2000" dirty="0" err="1"/>
+              <a:t>i</a:t>
+            </a:r>
+            <a:r>
+              <a:rPr lang="en-US" sz="2000" dirty="0"/>
+              <a:t>).</a:t>
+            </a:r>
+            <a:r>
+              <a:rPr lang="en-US" sz="2000" dirty="0" err="1"/>
+              <a:t>tfb</a:t>
+            </a:r>
+            <a:r>
+              <a:rPr lang="en-US" sz="2000" dirty="0"/>
+              <a:t> </a:t>
+            </a:r>
+            <a:r>
+              <a:rPr lang="en-US" sz="2000" dirty="0">
                 <a:solidFill>
                   <a:schemeClr val="accent5"/>
                 </a:solidFill>
               </a:rPr>
-              <a:t>Object array that contains the plot handle of the current measured by the Keithley for all pins</a:t>
+              <a:t>vector containing the calculated times (not measured) between each CV</a:t>
             </a:r>
           </a:p>
           <a:p>
@@ -19320,38 +19199,306 @@
               <a:buNone/>
             </a:pPr>
             <a:r>
-              <a:rPr lang="en-US" dirty="0"/>
+              <a:rPr lang="en-US" sz="2000" dirty="0"/>
               <a:t>MD(mu).</a:t>
             </a:r>
             <a:r>
-              <a:rPr lang="en-US" dirty="0" err="1"/>
-              <a:t>Plots.VfbTime</a:t>
-            </a:r>
-            <a:r>
-              <a:rPr lang="en-US" dirty="0"/>
+              <a:rPr lang="en-US" sz="2000" dirty="0" err="1"/>
+              <a:t>ExpData.Pin</a:t>
+            </a:r>
+            <a:r>
+              <a:rPr lang="en-US" sz="2000" dirty="0"/>
+              <a:t>(</a:t>
+            </a:r>
+            <a:r>
+              <a:rPr lang="en-US" sz="2000" dirty="0" err="1"/>
+              <a:t>i</a:t>
+            </a:r>
+            <a:r>
+              <a:rPr lang="en-US" sz="2000" dirty="0"/>
+              <a:t>).</a:t>
+            </a:r>
+            <a:r>
+              <a:rPr lang="en-US" sz="2000" dirty="0" err="1"/>
+              <a:t>Vfb</a:t>
+            </a:r>
+            <a:r>
+              <a:rPr lang="en-US" sz="2000" dirty="0"/>
               <a:t> </a:t>
             </a:r>
             <a:r>
-              <a:rPr lang="en-US" dirty="0">
+              <a:rPr lang="en-US" sz="2000" dirty="0">
                 <a:solidFill>
                   <a:schemeClr val="accent5"/>
                 </a:solidFill>
               </a:rPr>
-              <a:t>Object array that contains the flatband vs time plot handle</a:t>
+              <a:t>vector containing the extracted </a:t>
+            </a:r>
+            <a:r>
+              <a:rPr lang="en-US" sz="2000" dirty="0" err="1">
+                <a:solidFill>
+                  <a:schemeClr val="accent5"/>
+                </a:solidFill>
+              </a:rPr>
+              <a:t>flatbands</a:t>
+            </a:r>
+            <a:r>
+              <a:rPr lang="en-US" sz="2000" dirty="0">
+                <a:solidFill>
+                  <a:schemeClr val="accent5"/>
+                </a:solidFill>
+              </a:rPr>
+              <a:t> measured for each iteration</a:t>
             </a:r>
           </a:p>
           <a:p>
             <a:pPr marL="0" indent="0">
               <a:buNone/>
             </a:pPr>
-            <a:endParaRPr lang="en-US" dirty="0"/>
+            <a:r>
+              <a:rPr lang="en-US" sz="2000" dirty="0"/>
+              <a:t>MD(mu).</a:t>
+            </a:r>
+            <a:r>
+              <a:rPr lang="en-US" sz="2000" dirty="0" err="1"/>
+              <a:t>ExpData.Pin</a:t>
+            </a:r>
+            <a:r>
+              <a:rPr lang="en-US" sz="2000" dirty="0"/>
+              <a:t>(</a:t>
+            </a:r>
+            <a:r>
+              <a:rPr lang="en-US" sz="2000" dirty="0" err="1"/>
+              <a:t>i</a:t>
+            </a:r>
+            <a:r>
+              <a:rPr lang="en-US" sz="2000" dirty="0"/>
+              <a:t>).</a:t>
+            </a:r>
+            <a:r>
+              <a:rPr lang="en-US" sz="2000" dirty="0" err="1"/>
+              <a:t>VfbAve</a:t>
+            </a:r>
+            <a:r>
+              <a:rPr lang="en-US" sz="2000" dirty="0"/>
+              <a:t> </a:t>
+            </a:r>
+            <a:r>
+              <a:rPr lang="en-US" sz="2000" dirty="0">
+                <a:solidFill>
+                  <a:schemeClr val="accent5"/>
+                </a:solidFill>
+              </a:rPr>
+              <a:t>vector containing the flatband at each time point, averaged over the number of iterations</a:t>
+            </a:r>
+          </a:p>
+          <a:p>
+            <a:pPr marL="0" indent="0">
+              <a:buNone/>
+            </a:pPr>
+            <a:r>
+              <a:rPr lang="en-US" sz="2000" dirty="0"/>
+              <a:t>MD(mu).</a:t>
+            </a:r>
+            <a:r>
+              <a:rPr lang="en-US" sz="2000" dirty="0" err="1"/>
+              <a:t>ExpData.Pin</a:t>
+            </a:r>
+            <a:r>
+              <a:rPr lang="en-US" sz="2000" dirty="0"/>
+              <a:t>(</a:t>
+            </a:r>
+            <a:r>
+              <a:rPr lang="en-US" sz="2000" dirty="0" err="1"/>
+              <a:t>i</a:t>
+            </a:r>
+            <a:r>
+              <a:rPr lang="en-US" sz="2000" dirty="0"/>
+              <a:t>).</a:t>
+            </a:r>
+            <a:r>
+              <a:rPr lang="en-US" sz="2000" dirty="0" err="1"/>
+              <a:t>Cfit</a:t>
+            </a:r>
+            <a:r>
+              <a:rPr lang="en-US" sz="2000" dirty="0"/>
+              <a:t> </a:t>
+            </a:r>
+            <a:r>
+              <a:rPr lang="en-US" sz="2000" dirty="0">
+                <a:solidFill>
+                  <a:schemeClr val="accent5"/>
+                </a:solidFill>
+              </a:rPr>
+              <a:t>vector containing selected capacitance data (noisy part removed)</a:t>
+            </a:r>
+            <a:endParaRPr lang="en-US" sz="2000" dirty="0"/>
+          </a:p>
+          <a:p>
+            <a:pPr marL="0" indent="0">
+              <a:buNone/>
+            </a:pPr>
+            <a:r>
+              <a:rPr lang="en-US" sz="2000" dirty="0"/>
+              <a:t>MD(mu).</a:t>
+            </a:r>
+            <a:r>
+              <a:rPr lang="en-US" sz="2000" dirty="0" err="1"/>
+              <a:t>ExpData.Pin</a:t>
+            </a:r>
+            <a:r>
+              <a:rPr lang="en-US" sz="2000" dirty="0"/>
+              <a:t>(</a:t>
+            </a:r>
+            <a:r>
+              <a:rPr lang="en-US" sz="2000" dirty="0" err="1"/>
+              <a:t>i</a:t>
+            </a:r>
+            <a:r>
+              <a:rPr lang="en-US" sz="2000" dirty="0"/>
+              <a:t>).</a:t>
+            </a:r>
+            <a:r>
+              <a:rPr lang="en-US" sz="2000" dirty="0" err="1"/>
+              <a:t>Vfit</a:t>
+            </a:r>
+            <a:r>
+              <a:rPr lang="en-US" sz="2000" dirty="0"/>
+              <a:t> </a:t>
+            </a:r>
+            <a:r>
+              <a:rPr lang="en-US" sz="2000" dirty="0">
+                <a:solidFill>
+                  <a:schemeClr val="accent5"/>
+                </a:solidFill>
+              </a:rPr>
+              <a:t>vector containing selected voltage data (noisy part removed)</a:t>
+            </a:r>
+          </a:p>
+          <a:p>
+            <a:pPr marL="0" indent="0">
+              <a:buNone/>
+            </a:pPr>
+            <a:r>
+              <a:rPr lang="en-US" sz="2000" dirty="0"/>
+              <a:t>MD(mu).</a:t>
+            </a:r>
+            <a:r>
+              <a:rPr lang="en-US" sz="2000" dirty="0" err="1"/>
+              <a:t>ExpData.Pin</a:t>
+            </a:r>
+            <a:r>
+              <a:rPr lang="en-US" sz="2000" dirty="0"/>
+              <a:t>(</a:t>
+            </a:r>
+            <a:r>
+              <a:rPr lang="en-US" sz="2000" dirty="0" err="1"/>
+              <a:t>i</a:t>
+            </a:r>
+            <a:r>
+              <a:rPr lang="en-US" sz="2000" dirty="0"/>
+              <a:t>).</a:t>
+            </a:r>
+            <a:r>
+              <a:rPr lang="en-US" sz="2000" dirty="0" err="1"/>
+              <a:t>VfbStd</a:t>
+            </a:r>
+            <a:r>
+              <a:rPr lang="en-US" sz="2000" dirty="0"/>
+              <a:t> </a:t>
+            </a:r>
+            <a:r>
+              <a:rPr lang="en-US" sz="2000" dirty="0">
+                <a:solidFill>
+                  <a:schemeClr val="accent5"/>
+                </a:solidFill>
+              </a:rPr>
+              <a:t>vector containing the standard deviation of flatband at each time point</a:t>
+            </a:r>
+          </a:p>
+          <a:p>
+            <a:pPr marL="0" indent="0">
+              <a:buNone/>
+            </a:pPr>
+            <a:r>
+              <a:rPr lang="en-US" sz="2000" dirty="0"/>
+              <a:t>MD(mu).</a:t>
+            </a:r>
+            <a:r>
+              <a:rPr lang="en-US" sz="2000" dirty="0" err="1"/>
+              <a:t>ExpData.Pin</a:t>
+            </a:r>
+            <a:r>
+              <a:rPr lang="en-US" sz="2000" dirty="0"/>
+              <a:t>(</a:t>
+            </a:r>
+            <a:r>
+              <a:rPr lang="en-US" sz="2000" dirty="0" err="1"/>
+              <a:t>i</a:t>
+            </a:r>
+            <a:r>
+              <a:rPr lang="en-US" sz="2000" dirty="0"/>
+              <a:t>).IV </a:t>
+            </a:r>
+            <a:r>
+              <a:rPr lang="en-US" sz="2000" dirty="0">
+                <a:solidFill>
+                  <a:schemeClr val="accent5"/>
+                </a:solidFill>
+              </a:rPr>
+              <a:t>cell containing the IV curves </a:t>
+            </a:r>
+            <a:r>
+              <a:rPr lang="en-US" sz="2000">
+                <a:solidFill>
+                  <a:schemeClr val="accent5"/>
+                </a:solidFill>
+              </a:rPr>
+              <a:t>for each pin</a:t>
+            </a:r>
+            <a:endParaRPr lang="en-US" sz="2000" dirty="0">
+              <a:solidFill>
+                <a:schemeClr val="accent5"/>
+              </a:solidFill>
+            </a:endParaRPr>
+          </a:p>
+          <a:p>
+            <a:pPr marL="0" indent="0">
+              <a:buNone/>
+            </a:pPr>
+            <a:endParaRPr lang="en-US" sz="2000" dirty="0">
+              <a:solidFill>
+                <a:schemeClr val="accent5"/>
+              </a:solidFill>
+            </a:endParaRPr>
+          </a:p>
+          <a:p>
+            <a:pPr marL="0" indent="0">
+              <a:buNone/>
+            </a:pPr>
+            <a:endParaRPr lang="en-US" sz="2000" dirty="0"/>
+          </a:p>
+          <a:p>
+            <a:pPr marL="0" indent="0">
+              <a:buNone/>
+            </a:pPr>
+            <a:endParaRPr lang="en-US" sz="2000" dirty="0"/>
+          </a:p>
+          <a:p>
+            <a:pPr marL="0" indent="0">
+              <a:buNone/>
+            </a:pPr>
+            <a:endParaRPr lang="en-US" sz="2000" dirty="0"/>
+          </a:p>
+          <a:p>
+            <a:endParaRPr lang="en-US" sz="2000" dirty="0"/>
           </a:p>
         </p:txBody>
       </p:sp>
     </p:spTree>
     <p:extLst>
       <p:ext uri="{BB962C8B-B14F-4D97-AF65-F5344CB8AC3E}">
-        <p14:creationId xmlns:p14="http://schemas.microsoft.com/office/powerpoint/2010/main" val="3479373720"/>
+        <p14:creationId xmlns:p14="http://schemas.microsoft.com/office/powerpoint/2010/main" val="980625539"/>
       </p:ext>
     </p:extLst>
   </p:cSld>
@@ -19399,10 +19546,7 @@
           <a:bodyPr/>
           <a:lstStyle/>
           <a:p>
-            <a:r>
-              <a:rPr lang="en-US" dirty="0"/>
-              <a:t> </a:t>
-            </a:r>
+            <a:endParaRPr lang="en-US"/>
           </a:p>
         </p:txBody>
       </p:sp>
@@ -19430,7 +19574,7 @@
         </p:spPr>
         <p:txBody>
           <a:bodyPr>
-            <a:normAutofit lnSpcReduction="10000"/>
+            <a:normAutofit/>
           </a:bodyPr>
           <a:lstStyle/>
           <a:p>
@@ -19471,19 +19615,25 @@
             </a:r>
             <a:r>
               <a:rPr lang="en-US" sz="2000" dirty="0" err="1"/>
-              <a:t>ExpData.Pin</a:t>
-            </a:r>
+              <a:t>ExpData.Setup.PreBiasTime</a:t>
+            </a:r>
+            <a:endParaRPr lang="en-US" sz="2000" dirty="0"/>
+          </a:p>
+          <a:p>
+            <a:pPr marL="0" indent="0">
+              <a:buNone/>
+            </a:pPr>
             <a:r>
               <a:rPr lang="en-US" sz="2000" dirty="0"/>
-              <a:t>(</a:t>
+              <a:t>MD(mu).</a:t>
             </a:r>
             <a:r>
               <a:rPr lang="en-US" sz="2000" dirty="0" err="1"/>
-              <a:t>i</a:t>
+              <a:t>ExpData.Setup.t_offset_unit</a:t>
             </a:r>
             <a:r>
               <a:rPr lang="en-US" sz="2000" dirty="0"/>
-              <a:t>).C </a:t>
+              <a:t> </a:t>
             </a:r>
             <a:r>
               <a:rPr lang="en-US" sz="2000" dirty="0">
@@ -19491,32 +19641,15 @@
                   <a:schemeClr val="accent5"/>
                 </a:solidFill>
               </a:rPr>
-              <a:t>matrix containing the capacitance measurement data for hotplate n and pin i</a:t>
-            </a:r>
-          </a:p>
-          <a:p>
-            <a:pPr marL="0" indent="0">
-              <a:buNone/>
-            </a:pPr>
-            <a:r>
-              <a:rPr lang="en-US" sz="2000" dirty="0"/>
-              <a:t>MD(mu).</a:t>
-            </a:r>
-            <a:r>
-              <a:rPr lang="en-US" sz="2000" dirty="0" err="1"/>
-              <a:t>ExpData.Pin</a:t>
-            </a:r>
-            <a:r>
-              <a:rPr lang="en-US" sz="2000" dirty="0"/>
-              <a:t>(</a:t>
-            </a:r>
-            <a:r>
-              <a:rPr lang="en-US" sz="2000" dirty="0" err="1"/>
-              <a:t>i</a:t>
-            </a:r>
-            <a:r>
-              <a:rPr lang="en-US" sz="2000" dirty="0"/>
-              <a:t>).V </a:t>
+              <a:t>unit of the time offset (to define in </a:t>
+            </a:r>
+            <a:r>
+              <a:rPr lang="en-US" sz="2000" dirty="0" err="1">
+                <a:solidFill>
+                  <a:schemeClr val="accent5"/>
+                </a:solidFill>
+              </a:rPr>
+              <a:t>startproc</a:t>
             </a:r>
             <a:r>
               <a:rPr lang="en-US" sz="2000" dirty="0">
@@ -19524,8 +19657,9 @@
                   <a:schemeClr val="accent5"/>
                 </a:solidFill>
               </a:rPr>
-              <a:t>matrix containing the voltage measurement data for hotplate n and pin I</a:t>
-            </a:r>
+              <a:t>)</a:t>
+            </a:r>
+            <a:endParaRPr lang="en-US" sz="2000" dirty="0"/>
           </a:p>
           <a:p>
             <a:pPr marL="0" indent="0">
@@ -19537,19 +19671,11 @@
             </a:r>
             <a:r>
               <a:rPr lang="en-US" sz="2000" dirty="0" err="1"/>
-              <a:t>ExpData.Pin</a:t>
+              <a:t>ExpData.Setup.t_offset_value</a:t>
             </a:r>
             <a:r>
               <a:rPr lang="en-US" sz="2000" dirty="0"/>
-              <a:t>(</a:t>
-            </a:r>
-            <a:r>
-              <a:rPr lang="en-US" sz="2000" dirty="0" err="1"/>
-              <a:t>i</a:t>
-            </a:r>
-            <a:r>
-              <a:rPr lang="en-US" sz="2000" dirty="0"/>
-              <a:t>).R </a:t>
+              <a:t> </a:t>
             </a:r>
             <a:r>
               <a:rPr lang="en-US" sz="2000" dirty="0">
@@ -19557,83 +19683,15 @@
                   <a:schemeClr val="accent5"/>
                 </a:solidFill>
               </a:rPr>
-              <a:t>matrix containing the resistance measurement data for hotplate n and pin I</a:t>
-            </a:r>
-          </a:p>
-          <a:p>
-            <a:pPr marL="0" indent="0">
-              <a:buNone/>
-            </a:pPr>
-            <a:r>
-              <a:rPr lang="en-US" sz="2000" dirty="0"/>
-              <a:t>MD(mu).</a:t>
-            </a:r>
-            <a:r>
-              <a:rPr lang="en-US" sz="2000" dirty="0" err="1"/>
-              <a:t>ExpData.Pin</a:t>
-            </a:r>
-            <a:r>
-              <a:rPr lang="en-US" sz="2000" dirty="0"/>
-              <a:t>(</a:t>
-            </a:r>
-            <a:r>
-              <a:rPr lang="en-US" sz="2000" dirty="0" err="1"/>
-              <a:t>i</a:t>
-            </a:r>
-            <a:r>
-              <a:rPr lang="en-US" sz="2000" dirty="0"/>
-              <a:t>).</a:t>
-            </a:r>
-            <a:r>
-              <a:rPr lang="en-US" sz="2000" dirty="0" err="1"/>
-              <a:t>Vinput</a:t>
-            </a:r>
-            <a:r>
-              <a:rPr lang="en-US" sz="2000" dirty="0"/>
-              <a:t> </a:t>
-            </a:r>
-            <a:r>
-              <a:rPr lang="en-US" sz="2000" dirty="0">
+              <a:t>unit of the time offset (to define in </a:t>
+            </a:r>
+            <a:r>
+              <a:rPr lang="en-US" sz="2000" dirty="0" err="1">
                 <a:solidFill>
-                  <a:schemeClr val="accent1">
-                    <a:lumMod val="75000"/>
-                  </a:schemeClr>
+                  <a:schemeClr val="accent5"/>
                 </a:solidFill>
               </a:rPr>
-              <a:t>vector containing the user-defined voltage parameters on the app panel</a:t>
-            </a:r>
-          </a:p>
-          <a:p>
-            <a:pPr marL="0" indent="0">
-              <a:buNone/>
-            </a:pPr>
-            <a:r>
-              <a:rPr lang="en-US" sz="2000" dirty="0"/>
-              <a:t>MD(mu).</a:t>
-            </a:r>
-            <a:r>
-              <a:rPr lang="en-US" sz="2000" dirty="0" err="1"/>
-              <a:t>ExpData.Pin</a:t>
-            </a:r>
-            <a:r>
-              <a:rPr lang="en-US" sz="2000" dirty="0"/>
-              <a:t>(</a:t>
-            </a:r>
-            <a:r>
-              <a:rPr lang="en-US" sz="2000" dirty="0" err="1"/>
-              <a:t>i</a:t>
-            </a:r>
-            <a:r>
-              <a:rPr lang="en-US" sz="2000" dirty="0"/>
-              <a:t>).</a:t>
-            </a:r>
-            <a:r>
-              <a:rPr lang="en-US" sz="2000" dirty="0" err="1"/>
-              <a:t>tfb</a:t>
-            </a:r>
-            <a:r>
-              <a:rPr lang="en-US" sz="2000" dirty="0"/>
-              <a:t> </a:t>
+              <a:t>startproc</a:t>
             </a:r>
             <a:r>
               <a:rPr lang="en-US" sz="2000" dirty="0">
@@ -19641,8 +19699,9 @@
                   <a:schemeClr val="accent5"/>
                 </a:solidFill>
               </a:rPr>
-              <a:t>vector containing the calculated times (not measured) between each CV</a:t>
-            </a:r>
+              <a:t>)</a:t>
+            </a:r>
+            <a:endParaRPr lang="en-US" sz="2000" dirty="0"/>
           </a:p>
           <a:p>
             <a:pPr marL="0" indent="0">
@@ -19654,23 +19713,7 @@
             </a:r>
             <a:r>
               <a:rPr lang="en-US" sz="2000" dirty="0" err="1"/>
-              <a:t>ExpData.Pin</a:t>
-            </a:r>
-            <a:r>
-              <a:rPr lang="en-US" sz="2000" dirty="0"/>
-              <a:t>(</a:t>
-            </a:r>
-            <a:r>
-              <a:rPr lang="en-US" sz="2000" dirty="0" err="1"/>
-              <a:t>i</a:t>
-            </a:r>
-            <a:r>
-              <a:rPr lang="en-US" sz="2000" dirty="0"/>
-              <a:t>).</a:t>
-            </a:r>
-            <a:r>
-              <a:rPr lang="en-US" sz="2000" dirty="0" err="1"/>
-              <a:t>Vfb</a:t>
+              <a:t>ExpData.Setup.stressBiasValue</a:t>
             </a:r>
             <a:r>
               <a:rPr lang="en-US" sz="2000" dirty="0"/>
@@ -19682,7 +19725,32 @@
                   <a:schemeClr val="accent5"/>
                 </a:solidFill>
               </a:rPr>
-              <a:t>vector containing the extracted </a:t>
+              <a:t>value of steady-state bias (needs to be the same for all hotplates)</a:t>
+            </a:r>
+          </a:p>
+          <a:p>
+            <a:pPr marL="0" indent="0">
+              <a:buNone/>
+            </a:pPr>
+            <a:r>
+              <a:rPr lang="en-US" sz="2000" dirty="0"/>
+              <a:t>MD(mu).</a:t>
+            </a:r>
+            <a:r>
+              <a:rPr lang="en-US" sz="2000" dirty="0" err="1"/>
+              <a:t>ExpData.Setup.biastime_sec</a:t>
+            </a:r>
+            <a:r>
+              <a:rPr lang="en-US" sz="2000" dirty="0"/>
+              <a:t> </a:t>
+            </a:r>
+            <a:r>
+              <a:rPr lang="en-US" sz="2000" dirty="0">
+                <a:solidFill>
+                  <a:schemeClr val="accent5"/>
+                </a:solidFill>
+              </a:rPr>
+              <a:t>steady-state bias time converted to s (defined in </a:t>
             </a:r>
             <a:r>
               <a:rPr lang="en-US" sz="2000" dirty="0" err="1">
@@ -19690,7 +19758,7 @@
                   <a:schemeClr val="accent5"/>
                 </a:solidFill>
               </a:rPr>
-              <a:t>flatbands</a:t>
+              <a:t>startproc</a:t>
             </a:r>
             <a:r>
               <a:rPr lang="en-US" sz="2000" dirty="0">
@@ -19698,7 +19766,7 @@
                   <a:schemeClr val="accent5"/>
                 </a:solidFill>
               </a:rPr>
-              <a:t> measured for each iteration</a:t>
+              <a:t>)</a:t>
             </a:r>
           </a:p>
           <a:p>
@@ -19711,23 +19779,7 @@
             </a:r>
             <a:r>
               <a:rPr lang="en-US" sz="2000" dirty="0" err="1"/>
-              <a:t>ExpData.Pin</a:t>
-            </a:r>
-            <a:r>
-              <a:rPr lang="en-US" sz="2000" dirty="0"/>
-              <a:t>(</a:t>
-            </a:r>
-            <a:r>
-              <a:rPr lang="en-US" sz="2000" dirty="0" err="1"/>
-              <a:t>i</a:t>
-            </a:r>
-            <a:r>
-              <a:rPr lang="en-US" sz="2000" dirty="0"/>
-              <a:t>).</a:t>
-            </a:r>
-            <a:r>
-              <a:rPr lang="en-US" sz="2000" dirty="0" err="1"/>
-              <a:t>VfbAve</a:t>
+              <a:t>ExpData.Setup.TempC</a:t>
             </a:r>
             <a:r>
               <a:rPr lang="en-US" sz="2000" dirty="0"/>
@@ -19739,40 +19791,15 @@
                   <a:schemeClr val="accent5"/>
                 </a:solidFill>
               </a:rPr>
-              <a:t>vector containing the flatband at each time point, averaged over the number of iterations</a:t>
-            </a:r>
-          </a:p>
-          <a:p>
-            <a:pPr marL="0" indent="0">
-              <a:buNone/>
-            </a:pPr>
-            <a:r>
-              <a:rPr lang="en-US" sz="2000" dirty="0"/>
-              <a:t>MD(mu).</a:t>
-            </a:r>
-            <a:r>
-              <a:rPr lang="en-US" sz="2000" dirty="0" err="1"/>
-              <a:t>ExpData.Pin</a:t>
-            </a:r>
-            <a:r>
-              <a:rPr lang="en-US" sz="2000" dirty="0"/>
-              <a:t>(</a:t>
-            </a:r>
-            <a:r>
-              <a:rPr lang="en-US" sz="2000" dirty="0" err="1"/>
-              <a:t>i</a:t>
-            </a:r>
-            <a:r>
-              <a:rPr lang="en-US" sz="2000" dirty="0"/>
-              <a:t>).</a:t>
-            </a:r>
-            <a:r>
-              <a:rPr lang="en-US" sz="2000" dirty="0" err="1"/>
-              <a:t>Cfit</a:t>
-            </a:r>
-            <a:r>
-              <a:rPr lang="en-US" sz="2000" dirty="0"/>
-              <a:t> </a:t>
+              <a:t>cooling temperature (define in </a:t>
+            </a:r>
+            <a:r>
+              <a:rPr lang="en-US" sz="2000" dirty="0" err="1">
+                <a:solidFill>
+                  <a:schemeClr val="accent5"/>
+                </a:solidFill>
+              </a:rPr>
+              <a:t>startproc</a:t>
             </a:r>
             <a:r>
               <a:rPr lang="en-US" sz="2000" dirty="0">
@@ -19780,9 +19807,8 @@
                   <a:schemeClr val="accent5"/>
                 </a:solidFill>
               </a:rPr>
-              <a:t>vector containing selected capacitance data (noisy part removed)</a:t>
-            </a:r>
-            <a:endParaRPr lang="en-US" sz="2000" dirty="0"/>
+              <a:t>)</a:t>
+            </a:r>
           </a:p>
           <a:p>
             <a:pPr marL="0" indent="0">
@@ -19794,23 +19820,7 @@
             </a:r>
             <a:r>
               <a:rPr lang="en-US" sz="2000" dirty="0" err="1"/>
-              <a:t>ExpData.Pin</a:t>
-            </a:r>
-            <a:r>
-              <a:rPr lang="en-US" sz="2000" dirty="0"/>
-              <a:t>(</a:t>
-            </a:r>
-            <a:r>
-              <a:rPr lang="en-US" sz="2000" dirty="0" err="1"/>
-              <a:t>i</a:t>
-            </a:r>
-            <a:r>
-              <a:rPr lang="en-US" sz="2000" dirty="0"/>
-              <a:t>).</a:t>
-            </a:r>
-            <a:r>
-              <a:rPr lang="en-US" sz="2000" dirty="0" err="1"/>
-              <a:t>Vfit</a:t>
+              <a:t>ExpData.Setup.TempH</a:t>
             </a:r>
             <a:r>
               <a:rPr lang="en-US" sz="2000" dirty="0"/>
@@ -19822,40 +19832,15 @@
                   <a:schemeClr val="accent5"/>
                 </a:solidFill>
               </a:rPr>
-              <a:t>vector containing selected voltage data (noisy part removed)</a:t>
-            </a:r>
-          </a:p>
-          <a:p>
-            <a:pPr marL="0" indent="0">
-              <a:buNone/>
-            </a:pPr>
-            <a:r>
-              <a:rPr lang="en-US" sz="2000" dirty="0"/>
-              <a:t>MD(mu).</a:t>
-            </a:r>
-            <a:r>
-              <a:rPr lang="en-US" sz="2000" dirty="0" err="1"/>
-              <a:t>ExpData.Pin</a:t>
-            </a:r>
-            <a:r>
-              <a:rPr lang="en-US" sz="2000" dirty="0"/>
-              <a:t>(</a:t>
-            </a:r>
-            <a:r>
-              <a:rPr lang="en-US" sz="2000" dirty="0" err="1"/>
-              <a:t>i</a:t>
-            </a:r>
-            <a:r>
-              <a:rPr lang="en-US" sz="2000" dirty="0"/>
-              <a:t>).</a:t>
-            </a:r>
-            <a:r>
-              <a:rPr lang="en-US" sz="2000" dirty="0" err="1"/>
-              <a:t>VfbStd</a:t>
-            </a:r>
-            <a:r>
-              <a:rPr lang="en-US" sz="2000" dirty="0"/>
-              <a:t> </a:t>
+              <a:t>stress temperature (define in </a:t>
+            </a:r>
+            <a:r>
+              <a:rPr lang="en-US" sz="2000" dirty="0" err="1">
+                <a:solidFill>
+                  <a:schemeClr val="accent5"/>
+                </a:solidFill>
+              </a:rPr>
+              <a:t>startproc</a:t>
             </a:r>
             <a:r>
               <a:rPr lang="en-US" sz="2000" dirty="0">
@@ -19863,7 +19848,7 @@
                   <a:schemeClr val="accent5"/>
                 </a:solidFill>
               </a:rPr>
-              <a:t>vector containing the standard deviation of flatband at each time point</a:t>
+              <a:t>)</a:t>
             </a:r>
           </a:p>
           <a:p>
@@ -19876,19 +19861,11 @@
             </a:r>
             <a:r>
               <a:rPr lang="en-US" sz="2000" dirty="0" err="1"/>
-              <a:t>ExpData.Pin</a:t>
+              <a:t>ExpData.Setup.CalTempH</a:t>
             </a:r>
             <a:r>
               <a:rPr lang="en-US" sz="2000" dirty="0"/>
-              <a:t>(</a:t>
-            </a:r>
-            <a:r>
-              <a:rPr lang="en-US" sz="2000" dirty="0" err="1"/>
-              <a:t>i</a:t>
-            </a:r>
-            <a:r>
-              <a:rPr lang="en-US" sz="2000" dirty="0"/>
-              <a:t>).IV </a:t>
+              <a:t> </a:t>
             </a:r>
             <a:r>
               <a:rPr lang="en-US" sz="2000" dirty="0">
@@ -19896,21 +19873,67 @@
                   <a:schemeClr val="accent5"/>
                 </a:solidFill>
               </a:rPr>
-              <a:t>cell containing the IV curves </a:t>
-            </a:r>
-            <a:r>
-              <a:rPr lang="en-US" sz="2000">
+              <a:t>stress temperature corrected with calibration curve (defined in </a:t>
+            </a:r>
+            <a:r>
+              <a:rPr lang="en-US" sz="2000" dirty="0" err="1">
                 <a:solidFill>
                   <a:schemeClr val="accent5"/>
                 </a:solidFill>
               </a:rPr>
-              <a:t>for each pin</a:t>
-            </a:r>
-            <a:endParaRPr lang="en-US" sz="2000" dirty="0">
-              <a:solidFill>
-                <a:schemeClr val="accent5"/>
-              </a:solidFill>
-            </a:endParaRPr>
+              <a:t>startproc</a:t>
+            </a:r>
+            <a:r>
+              <a:rPr lang="en-US" sz="2000" dirty="0">
+                <a:solidFill>
+                  <a:schemeClr val="accent5"/>
+                </a:solidFill>
+              </a:rPr>
+              <a:t>)</a:t>
+            </a:r>
+            <a:endParaRPr lang="en-US" sz="2000" dirty="0"/>
+          </a:p>
+          <a:p>
+            <a:pPr marL="0" indent="0">
+              <a:buNone/>
+            </a:pPr>
+            <a:r>
+              <a:rPr lang="en-US" sz="2000" dirty="0"/>
+              <a:t>MD(mu).</a:t>
+            </a:r>
+            <a:r>
+              <a:rPr lang="en-US" sz="2000" dirty="0" err="1"/>
+              <a:t>ExpData.Setup.CalTempC</a:t>
+            </a:r>
+            <a:r>
+              <a:rPr lang="en-US" sz="2000" dirty="0"/>
+              <a:t> </a:t>
+            </a:r>
+            <a:r>
+              <a:rPr lang="en-US" sz="2000" dirty="0">
+                <a:solidFill>
+                  <a:schemeClr val="accent5"/>
+                </a:solidFill>
+              </a:rPr>
+              <a:t>cool temperature corrected with calibration curve (defined in </a:t>
+            </a:r>
+            <a:r>
+              <a:rPr lang="en-US" sz="2000" dirty="0" err="1">
+                <a:solidFill>
+                  <a:schemeClr val="accent5"/>
+                </a:solidFill>
+              </a:rPr>
+              <a:t>startproc</a:t>
+            </a:r>
+            <a:r>
+              <a:rPr lang="en-US" sz="2000" dirty="0">
+                <a:solidFill>
+                  <a:schemeClr val="accent5"/>
+                </a:solidFill>
+              </a:rPr>
+              <a:t>)</a:t>
+            </a:r>
+            <a:endParaRPr lang="en-US" sz="2000" dirty="0"/>
           </a:p>
           <a:p>
             <a:pPr marL="0" indent="0">
@@ -19926,13 +19949,11 @@
             <a:pPr marL="0" indent="0">
               <a:buNone/>
             </a:pPr>
-            <a:endParaRPr lang="en-US" sz="2000" dirty="0"/>
-          </a:p>
-          <a:p>
-            <a:pPr marL="0" indent="0">
-              <a:buNone/>
-            </a:pPr>
-            <a:endParaRPr lang="en-US" sz="2000" dirty="0"/>
+            <a:endParaRPr lang="en-US" sz="2000" dirty="0">
+              <a:solidFill>
+                <a:schemeClr val="accent5"/>
+              </a:solidFill>
+            </a:endParaRPr>
           </a:p>
           <a:p>
             <a:pPr marL="0" indent="0">
@@ -19948,7 +19969,7 @@
     </p:spTree>
     <p:extLst>
       <p:ext uri="{BB962C8B-B14F-4D97-AF65-F5344CB8AC3E}">
-        <p14:creationId xmlns:p14="http://schemas.microsoft.com/office/powerpoint/2010/main" val="980625539"/>
+        <p14:creationId xmlns:p14="http://schemas.microsoft.com/office/powerpoint/2010/main" val="2558989793"/>
       </p:ext>
     </p:extLst>
   </p:cSld>

</xml_diff>